<commit_message>
addressed many issues raised by Ben Pfaff
</commit_message>
<xml_diff>
--- a/p4-16/spec/P4-16-draft-spec.pptx
+++ b/p4-16/spec/P4-16-draft-spec.pptx
@@ -226,7 +226,7 @@
           <a:p>
             <a:fld id="{DED3B27D-5B62-AC40-B6AC-59B5C583BAA4}" type="datetimeFigureOut">
               <a:rPr lang="en-US" smtClean="0"/>
-              <a:t>6/13/2016</a:t>
+              <a:t>8/4/2016</a:t>
             </a:fld>
             <a:endParaRPr lang="en-US"/>
           </a:p>
@@ -672,7 +672,7 @@
           <a:p>
             <a:fld id="{E5FA88D9-A900-BE49-8FB1-39E9E0AFC9E6}" type="datetimeFigureOut">
               <a:rPr lang="en-US" smtClean="0"/>
-              <a:t>6/13/2016</a:t>
+              <a:t>8/4/2016</a:t>
             </a:fld>
             <a:endParaRPr lang="en-US"/>
           </a:p>
@@ -840,7 +840,7 @@
           <a:p>
             <a:fld id="{E5FA88D9-A900-BE49-8FB1-39E9E0AFC9E6}" type="datetimeFigureOut">
               <a:rPr lang="en-US" smtClean="0"/>
-              <a:t>6/13/2016</a:t>
+              <a:t>8/4/2016</a:t>
             </a:fld>
             <a:endParaRPr lang="en-US"/>
           </a:p>
@@ -1018,7 +1018,7 @@
           <a:p>
             <a:fld id="{E5FA88D9-A900-BE49-8FB1-39E9E0AFC9E6}" type="datetimeFigureOut">
               <a:rPr lang="en-US" smtClean="0"/>
-              <a:t>6/13/2016</a:t>
+              <a:t>8/4/2016</a:t>
             </a:fld>
             <a:endParaRPr lang="en-US"/>
           </a:p>
@@ -1186,7 +1186,7 @@
           <a:p>
             <a:fld id="{E5FA88D9-A900-BE49-8FB1-39E9E0AFC9E6}" type="datetimeFigureOut">
               <a:rPr lang="en-US" smtClean="0"/>
-              <a:t>6/13/2016</a:t>
+              <a:t>8/4/2016</a:t>
             </a:fld>
             <a:endParaRPr lang="en-US"/>
           </a:p>
@@ -1431,7 +1431,7 @@
           <a:p>
             <a:fld id="{E5FA88D9-A900-BE49-8FB1-39E9E0AFC9E6}" type="datetimeFigureOut">
               <a:rPr lang="en-US" smtClean="0"/>
-              <a:t>6/13/2016</a:t>
+              <a:t>8/4/2016</a:t>
             </a:fld>
             <a:endParaRPr lang="en-US"/>
           </a:p>
@@ -1716,7 +1716,7 @@
           <a:p>
             <a:fld id="{E5FA88D9-A900-BE49-8FB1-39E9E0AFC9E6}" type="datetimeFigureOut">
               <a:rPr lang="en-US" smtClean="0"/>
-              <a:t>6/13/2016</a:t>
+              <a:t>8/4/2016</a:t>
             </a:fld>
             <a:endParaRPr lang="en-US"/>
           </a:p>
@@ -2135,7 +2135,7 @@
           <a:p>
             <a:fld id="{E5FA88D9-A900-BE49-8FB1-39E9E0AFC9E6}" type="datetimeFigureOut">
               <a:rPr lang="en-US" smtClean="0"/>
-              <a:t>6/13/2016</a:t>
+              <a:t>8/4/2016</a:t>
             </a:fld>
             <a:endParaRPr lang="en-US"/>
           </a:p>
@@ -2252,7 +2252,7 @@
           <a:p>
             <a:fld id="{E5FA88D9-A900-BE49-8FB1-39E9E0AFC9E6}" type="datetimeFigureOut">
               <a:rPr lang="en-US" smtClean="0"/>
-              <a:t>6/13/2016</a:t>
+              <a:t>8/4/2016</a:t>
             </a:fld>
             <a:endParaRPr lang="en-US"/>
           </a:p>
@@ -2347,7 +2347,7 @@
           <a:p>
             <a:fld id="{E5FA88D9-A900-BE49-8FB1-39E9E0AFC9E6}" type="datetimeFigureOut">
               <a:rPr lang="en-US" smtClean="0"/>
-              <a:t>6/13/2016</a:t>
+              <a:t>8/4/2016</a:t>
             </a:fld>
             <a:endParaRPr lang="en-US"/>
           </a:p>
@@ -2622,7 +2622,7 @@
           <a:p>
             <a:fld id="{E5FA88D9-A900-BE49-8FB1-39E9E0AFC9E6}" type="datetimeFigureOut">
               <a:rPr lang="en-US" smtClean="0"/>
-              <a:t>6/13/2016</a:t>
+              <a:t>8/4/2016</a:t>
             </a:fld>
             <a:endParaRPr lang="en-US"/>
           </a:p>
@@ -2874,7 +2874,7 @@
           <a:p>
             <a:fld id="{E5FA88D9-A900-BE49-8FB1-39E9E0AFC9E6}" type="datetimeFigureOut">
               <a:rPr lang="en-US" smtClean="0"/>
-              <a:t>6/13/2016</a:t>
+              <a:t>8/4/2016</a:t>
             </a:fld>
             <a:endParaRPr lang="en-US"/>
           </a:p>
@@ -3085,7 +3085,7 @@
           <a:p>
             <a:fld id="{E5FA88D9-A900-BE49-8FB1-39E9E0AFC9E6}" type="datetimeFigureOut">
               <a:rPr lang="en-US" smtClean="0"/>
-              <a:t>6/13/2016</a:t>
+              <a:t>8/4/2016</a:t>
             </a:fld>
             <a:endParaRPr lang="en-US"/>
           </a:p>
@@ -13170,11 +13170,6 @@
               </a:rPr>
               <a:t>v1.1)</a:t>
             </a:r>
-            <a:endParaRPr lang="en-US" sz="2400" dirty="0" smtClean="0">
-              <a:solidFill>
-                <a:schemeClr val="tx1"/>
-              </a:solidFill>
-            </a:endParaRPr>
           </a:p>
           <a:p>
             <a:pPr algn="ctr"/>
@@ -16684,7 +16679,7 @@
         <p:spPr>
           <a:xfrm>
             <a:off x="3011556" y="2698760"/>
-            <a:ext cx="1561491" cy="755500"/>
+            <a:ext cx="1469751" cy="755500"/>
           </a:xfrm>
           <a:prstGeom prst="rect">
             <a:avLst/>
@@ -16712,24 +16707,41 @@
           <a:p>
             <a:pPr algn="ctr"/>
             <a:r>
-              <a:rPr lang="en-US" sz="1600" dirty="0">
+              <a:rPr lang="en-US" sz="1600" dirty="0" err="1" smtClean="0">
+                <a:solidFill>
+                  <a:schemeClr val="tx1"/>
+                </a:solidFill>
+              </a:rPr>
+              <a:t>Dataplane</a:t>
+            </a:r>
+            <a:r>
+              <a:rPr lang="en-US" sz="1600" dirty="0" smtClean="0">
+                <a:solidFill>
+                  <a:schemeClr val="tx1"/>
+                </a:solidFill>
+              </a:rPr>
+              <a:t/>
+            </a:r>
+            <a:br>
+              <a:rPr lang="en-US" sz="1600" dirty="0" smtClean="0">
+                <a:solidFill>
+                  <a:schemeClr val="tx1"/>
+                </a:solidFill>
+              </a:rPr>
+            </a:br>
+            <a:r>
+              <a:rPr lang="en-US" sz="1600" dirty="0" smtClean="0">
                 <a:solidFill>
                   <a:schemeClr val="tx1"/>
                 </a:solidFill>
               </a:rPr>
               <a:t>runtime</a:t>
             </a:r>
-          </a:p>
-          <a:p>
-            <a:pPr algn="ctr"/>
-            <a:r>
-              <a:rPr lang="en-US" sz="1600" dirty="0">
-                <a:solidFill>
-                  <a:schemeClr val="tx1"/>
-                </a:solidFill>
-              </a:rPr>
-              <a:t>program</a:t>
-            </a:r>
+            <a:endParaRPr lang="en-US" sz="1600" dirty="0">
+              <a:solidFill>
+                <a:schemeClr val="tx1"/>
+              </a:solidFill>
+            </a:endParaRPr>
           </a:p>
         </p:txBody>
       </p:sp>
@@ -16881,7 +16893,7 @@
         </p:nvSpPr>
         <p:spPr>
           <a:xfrm rot="16200000">
-            <a:off x="7300514" y="2227042"/>
+            <a:off x="6848741" y="2296005"/>
             <a:ext cx="591807" cy="351628"/>
           </a:xfrm>
           <a:prstGeom prst="leftRightArrow">
@@ -17284,8 +17296,8 @@
         </p:nvSpPr>
         <p:spPr>
           <a:xfrm>
-            <a:off x="6599557" y="2106114"/>
-            <a:ext cx="821046" cy="584776"/>
+            <a:off x="7272803" y="2186519"/>
+            <a:ext cx="769250" cy="584775"/>
           </a:xfrm>
           <a:prstGeom prst="rect">
             <a:avLst/>
@@ -17298,12 +17310,14 @@
           </a:bodyPr>
           <a:lstStyle/>
           <a:p>
+            <a:pPr algn="r"/>
             <a:r>
               <a:rPr lang="en-US" sz="1600" i="1" dirty="0"/>
               <a:t>control</a:t>
             </a:r>
           </a:p>
           <a:p>
+            <a:pPr algn="r"/>
             <a:r>
               <a:rPr lang="en-US" sz="1600" i="1" dirty="0"/>
               <a:t>signals</a:t>
@@ -17633,8 +17647,8 @@
         </p:nvSpPr>
         <p:spPr>
           <a:xfrm>
-            <a:off x="4578857" y="2914199"/>
-            <a:ext cx="615448" cy="364291"/>
+            <a:off x="4481308" y="2914199"/>
+            <a:ext cx="518322" cy="364291"/>
           </a:xfrm>
           <a:prstGeom prst="rightArrow">
             <a:avLst/>

</xml_diff>

<commit_message>
new round of fixes
</commit_message>
<xml_diff>
--- a/p4-16/spec/P4-16-draft-spec.pptx
+++ b/p4-16/spec/P4-16-draft-spec.pptx
@@ -226,7 +226,7 @@
           <a:p>
             <a:fld id="{DED3B27D-5B62-AC40-B6AC-59B5C583BAA4}" type="datetimeFigureOut">
               <a:rPr lang="en-US" smtClean="0"/>
-              <a:t>8/4/2016</a:t>
+              <a:t>10/19/2016</a:t>
             </a:fld>
             <a:endParaRPr lang="en-US"/>
           </a:p>
@@ -672,7 +672,7 @@
           <a:p>
             <a:fld id="{E5FA88D9-A900-BE49-8FB1-39E9E0AFC9E6}" type="datetimeFigureOut">
               <a:rPr lang="en-US" smtClean="0"/>
-              <a:t>8/4/2016</a:t>
+              <a:t>10/19/2016</a:t>
             </a:fld>
             <a:endParaRPr lang="en-US"/>
           </a:p>
@@ -840,7 +840,7 @@
           <a:p>
             <a:fld id="{E5FA88D9-A900-BE49-8FB1-39E9E0AFC9E6}" type="datetimeFigureOut">
               <a:rPr lang="en-US" smtClean="0"/>
-              <a:t>8/4/2016</a:t>
+              <a:t>10/19/2016</a:t>
             </a:fld>
             <a:endParaRPr lang="en-US"/>
           </a:p>
@@ -1018,7 +1018,7 @@
           <a:p>
             <a:fld id="{E5FA88D9-A900-BE49-8FB1-39E9E0AFC9E6}" type="datetimeFigureOut">
               <a:rPr lang="en-US" smtClean="0"/>
-              <a:t>8/4/2016</a:t>
+              <a:t>10/19/2016</a:t>
             </a:fld>
             <a:endParaRPr lang="en-US"/>
           </a:p>
@@ -1186,7 +1186,7 @@
           <a:p>
             <a:fld id="{E5FA88D9-A900-BE49-8FB1-39E9E0AFC9E6}" type="datetimeFigureOut">
               <a:rPr lang="en-US" smtClean="0"/>
-              <a:t>8/4/2016</a:t>
+              <a:t>10/19/2016</a:t>
             </a:fld>
             <a:endParaRPr lang="en-US"/>
           </a:p>
@@ -1431,7 +1431,7 @@
           <a:p>
             <a:fld id="{E5FA88D9-A900-BE49-8FB1-39E9E0AFC9E6}" type="datetimeFigureOut">
               <a:rPr lang="en-US" smtClean="0"/>
-              <a:t>8/4/2016</a:t>
+              <a:t>10/19/2016</a:t>
             </a:fld>
             <a:endParaRPr lang="en-US"/>
           </a:p>
@@ -1716,7 +1716,7 @@
           <a:p>
             <a:fld id="{E5FA88D9-A900-BE49-8FB1-39E9E0AFC9E6}" type="datetimeFigureOut">
               <a:rPr lang="en-US" smtClean="0"/>
-              <a:t>8/4/2016</a:t>
+              <a:t>10/19/2016</a:t>
             </a:fld>
             <a:endParaRPr lang="en-US"/>
           </a:p>
@@ -2135,7 +2135,7 @@
           <a:p>
             <a:fld id="{E5FA88D9-A900-BE49-8FB1-39E9E0AFC9E6}" type="datetimeFigureOut">
               <a:rPr lang="en-US" smtClean="0"/>
-              <a:t>8/4/2016</a:t>
+              <a:t>10/19/2016</a:t>
             </a:fld>
             <a:endParaRPr lang="en-US"/>
           </a:p>
@@ -2252,7 +2252,7 @@
           <a:p>
             <a:fld id="{E5FA88D9-A900-BE49-8FB1-39E9E0AFC9E6}" type="datetimeFigureOut">
               <a:rPr lang="en-US" smtClean="0"/>
-              <a:t>8/4/2016</a:t>
+              <a:t>10/19/2016</a:t>
             </a:fld>
             <a:endParaRPr lang="en-US"/>
           </a:p>
@@ -2347,7 +2347,7 @@
           <a:p>
             <a:fld id="{E5FA88D9-A900-BE49-8FB1-39E9E0AFC9E6}" type="datetimeFigureOut">
               <a:rPr lang="en-US" smtClean="0"/>
-              <a:t>8/4/2016</a:t>
+              <a:t>10/19/2016</a:t>
             </a:fld>
             <a:endParaRPr lang="en-US"/>
           </a:p>
@@ -2622,7 +2622,7 @@
           <a:p>
             <a:fld id="{E5FA88D9-A900-BE49-8FB1-39E9E0AFC9E6}" type="datetimeFigureOut">
               <a:rPr lang="en-US" smtClean="0"/>
-              <a:t>8/4/2016</a:t>
+              <a:t>10/19/2016</a:t>
             </a:fld>
             <a:endParaRPr lang="en-US"/>
           </a:p>
@@ -2874,7 +2874,7 @@
           <a:p>
             <a:fld id="{E5FA88D9-A900-BE49-8FB1-39E9E0AFC9E6}" type="datetimeFigureOut">
               <a:rPr lang="en-US" smtClean="0"/>
-              <a:t>8/4/2016</a:t>
+              <a:t>10/19/2016</a:t>
             </a:fld>
             <a:endParaRPr lang="en-US"/>
           </a:p>
@@ -3085,7 +3085,7 @@
           <a:p>
             <a:fld id="{E5FA88D9-A900-BE49-8FB1-39E9E0AFC9E6}" type="datetimeFigureOut">
               <a:rPr lang="en-US" smtClean="0"/>
-              <a:t>8/4/2016</a:t>
+              <a:t>10/19/2016</a:t>
             </a:fld>
             <a:endParaRPr lang="en-US"/>
           </a:p>
@@ -3483,7 +3483,15 @@
             </a:r>
             <a:r>
               <a:rPr lang="en-US" dirty="0" smtClean="0"/>
-              <a:t>P4-16 </a:t>
+              <a:t>P4</a:t>
+            </a:r>
+            <a:r>
+              <a:rPr lang="en-US" baseline="-25000" dirty="0" smtClean="0"/>
+              <a:t>16</a:t>
+            </a:r>
+            <a:r>
+              <a:rPr lang="en-US" dirty="0" smtClean="0"/>
+              <a:t> </a:t>
             </a:r>
             <a:r>
               <a:rPr lang="en-US" dirty="0"/>
@@ -13137,7 +13145,31 @@
                   <a:schemeClr val="tx1"/>
                 </a:solidFill>
               </a:rPr>
-              <a:t>P4-14 </a:t>
+              <a:t>P4</a:t>
+            </a:r>
+            <a:r>
+              <a:rPr lang="en-US" sz="2400" baseline="-25000" dirty="0" smtClean="0">
+                <a:solidFill>
+                  <a:schemeClr val="tx1"/>
+                </a:solidFill>
+              </a:rPr>
+              <a:t>14</a:t>
+            </a:r>
+            <a:r>
+              <a:rPr lang="en-US" sz="2400" dirty="0" smtClean="0">
+                <a:solidFill>
+                  <a:schemeClr val="tx1"/>
+                </a:solidFill>
+              </a:rPr>
+              <a:t> </a:t>
+            </a:r>
+            <a:r>
+              <a:rPr lang="en-US" sz="2400" dirty="0" smtClean="0">
+                <a:solidFill>
+                  <a:schemeClr val="tx1"/>
+                </a:solidFill>
+              </a:rPr>
+              <a:t/>
             </a:r>
             <a:br>
               <a:rPr lang="en-US" sz="2400" dirty="0" smtClean="0">
@@ -13244,7 +13276,23 @@
                   <a:schemeClr val="tx1"/>
                 </a:solidFill>
               </a:rPr>
-              <a:t>P4-16 </a:t>
+              <a:t>P4</a:t>
+            </a:r>
+            <a:r>
+              <a:rPr lang="en-US" sz="2400" baseline="-25000" dirty="0" smtClean="0">
+                <a:solidFill>
+                  <a:schemeClr val="tx1"/>
+                </a:solidFill>
+              </a:rPr>
+              <a:t>16</a:t>
+            </a:r>
+            <a:r>
+              <a:rPr lang="en-US" sz="2400" dirty="0" smtClean="0">
+                <a:solidFill>
+                  <a:schemeClr val="tx1"/>
+                </a:solidFill>
+              </a:rPr>
+              <a:t> </a:t>
             </a:r>
             <a:r>
               <a:rPr lang="en-US" sz="2400" dirty="0">

</xml_diff>

<commit_message>
New version of spec published
* Separated "target" and "architecture"
* Bug fixes in grammar
* Only one checksum unit example
* Oxford ", and" fixes
* fix various small typos
* rewrote section on concurrency, added @atomic annotation
* made -16 and -14 into subscripts
* some additions in the preprocessor section (#ifndef, #elif, removal
  of backslash-newline)
* Bug fixes in the definition of integer literals: all literals are
  positive
* Removed duplicate section about tuple expressions; the description
  in the section about select expressions is sufficient
* allow empty select case lists
* packet length is expressed in bytes
* reformatted reserved keywords into 3 columns instead of a table
</commit_message>
<xml_diff>
--- a/p4-16/spec/P4-16-draft-spec.pptx
+++ b/p4-16/spec/P4-16-draft-spec.pptx
@@ -226,7 +226,7 @@
           <a:p>
             <a:fld id="{DED3B27D-5B62-AC40-B6AC-59B5C583BAA4}" type="datetimeFigureOut">
               <a:rPr lang="en-US" smtClean="0"/>
-              <a:t>8/4/2016</a:t>
+              <a:t>10/19/2016</a:t>
             </a:fld>
             <a:endParaRPr lang="en-US"/>
           </a:p>
@@ -672,7 +672,7 @@
           <a:p>
             <a:fld id="{E5FA88D9-A900-BE49-8FB1-39E9E0AFC9E6}" type="datetimeFigureOut">
               <a:rPr lang="en-US" smtClean="0"/>
-              <a:t>8/4/2016</a:t>
+              <a:t>10/19/2016</a:t>
             </a:fld>
             <a:endParaRPr lang="en-US"/>
           </a:p>
@@ -840,7 +840,7 @@
           <a:p>
             <a:fld id="{E5FA88D9-A900-BE49-8FB1-39E9E0AFC9E6}" type="datetimeFigureOut">
               <a:rPr lang="en-US" smtClean="0"/>
-              <a:t>8/4/2016</a:t>
+              <a:t>10/19/2016</a:t>
             </a:fld>
             <a:endParaRPr lang="en-US"/>
           </a:p>
@@ -1018,7 +1018,7 @@
           <a:p>
             <a:fld id="{E5FA88D9-A900-BE49-8FB1-39E9E0AFC9E6}" type="datetimeFigureOut">
               <a:rPr lang="en-US" smtClean="0"/>
-              <a:t>8/4/2016</a:t>
+              <a:t>10/19/2016</a:t>
             </a:fld>
             <a:endParaRPr lang="en-US"/>
           </a:p>
@@ -1186,7 +1186,7 @@
           <a:p>
             <a:fld id="{E5FA88D9-A900-BE49-8FB1-39E9E0AFC9E6}" type="datetimeFigureOut">
               <a:rPr lang="en-US" smtClean="0"/>
-              <a:t>8/4/2016</a:t>
+              <a:t>10/19/2016</a:t>
             </a:fld>
             <a:endParaRPr lang="en-US"/>
           </a:p>
@@ -1431,7 +1431,7 @@
           <a:p>
             <a:fld id="{E5FA88D9-A900-BE49-8FB1-39E9E0AFC9E6}" type="datetimeFigureOut">
               <a:rPr lang="en-US" smtClean="0"/>
-              <a:t>8/4/2016</a:t>
+              <a:t>10/19/2016</a:t>
             </a:fld>
             <a:endParaRPr lang="en-US"/>
           </a:p>
@@ -1716,7 +1716,7 @@
           <a:p>
             <a:fld id="{E5FA88D9-A900-BE49-8FB1-39E9E0AFC9E6}" type="datetimeFigureOut">
               <a:rPr lang="en-US" smtClean="0"/>
-              <a:t>8/4/2016</a:t>
+              <a:t>10/19/2016</a:t>
             </a:fld>
             <a:endParaRPr lang="en-US"/>
           </a:p>
@@ -2135,7 +2135,7 @@
           <a:p>
             <a:fld id="{E5FA88D9-A900-BE49-8FB1-39E9E0AFC9E6}" type="datetimeFigureOut">
               <a:rPr lang="en-US" smtClean="0"/>
-              <a:t>8/4/2016</a:t>
+              <a:t>10/19/2016</a:t>
             </a:fld>
             <a:endParaRPr lang="en-US"/>
           </a:p>
@@ -2252,7 +2252,7 @@
           <a:p>
             <a:fld id="{E5FA88D9-A900-BE49-8FB1-39E9E0AFC9E6}" type="datetimeFigureOut">
               <a:rPr lang="en-US" smtClean="0"/>
-              <a:t>8/4/2016</a:t>
+              <a:t>10/19/2016</a:t>
             </a:fld>
             <a:endParaRPr lang="en-US"/>
           </a:p>
@@ -2347,7 +2347,7 @@
           <a:p>
             <a:fld id="{E5FA88D9-A900-BE49-8FB1-39E9E0AFC9E6}" type="datetimeFigureOut">
               <a:rPr lang="en-US" smtClean="0"/>
-              <a:t>8/4/2016</a:t>
+              <a:t>10/19/2016</a:t>
             </a:fld>
             <a:endParaRPr lang="en-US"/>
           </a:p>
@@ -2622,7 +2622,7 @@
           <a:p>
             <a:fld id="{E5FA88D9-A900-BE49-8FB1-39E9E0AFC9E6}" type="datetimeFigureOut">
               <a:rPr lang="en-US" smtClean="0"/>
-              <a:t>8/4/2016</a:t>
+              <a:t>10/19/2016</a:t>
             </a:fld>
             <a:endParaRPr lang="en-US"/>
           </a:p>
@@ -2874,7 +2874,7 @@
           <a:p>
             <a:fld id="{E5FA88D9-A900-BE49-8FB1-39E9E0AFC9E6}" type="datetimeFigureOut">
               <a:rPr lang="en-US" smtClean="0"/>
-              <a:t>8/4/2016</a:t>
+              <a:t>10/19/2016</a:t>
             </a:fld>
             <a:endParaRPr lang="en-US"/>
           </a:p>
@@ -3085,7 +3085,7 @@
           <a:p>
             <a:fld id="{E5FA88D9-A900-BE49-8FB1-39E9E0AFC9E6}" type="datetimeFigureOut">
               <a:rPr lang="en-US" smtClean="0"/>
-              <a:t>8/4/2016</a:t>
+              <a:t>10/19/2016</a:t>
             </a:fld>
             <a:endParaRPr lang="en-US"/>
           </a:p>
@@ -3483,7 +3483,15 @@
             </a:r>
             <a:r>
               <a:rPr lang="en-US" dirty="0" smtClean="0"/>
-              <a:t>P4-16 </a:t>
+              <a:t>P4</a:t>
+            </a:r>
+            <a:r>
+              <a:rPr lang="en-US" baseline="-25000" dirty="0" smtClean="0"/>
+              <a:t>16</a:t>
+            </a:r>
+            <a:r>
+              <a:rPr lang="en-US" dirty="0" smtClean="0"/>
+              <a:t> </a:t>
             </a:r>
             <a:r>
               <a:rPr lang="en-US" dirty="0"/>
@@ -13137,7 +13145,31 @@
                   <a:schemeClr val="tx1"/>
                 </a:solidFill>
               </a:rPr>
-              <a:t>P4-14 </a:t>
+              <a:t>P4</a:t>
+            </a:r>
+            <a:r>
+              <a:rPr lang="en-US" sz="2400" baseline="-25000" dirty="0" smtClean="0">
+                <a:solidFill>
+                  <a:schemeClr val="tx1"/>
+                </a:solidFill>
+              </a:rPr>
+              <a:t>14</a:t>
+            </a:r>
+            <a:r>
+              <a:rPr lang="en-US" sz="2400" dirty="0" smtClean="0">
+                <a:solidFill>
+                  <a:schemeClr val="tx1"/>
+                </a:solidFill>
+              </a:rPr>
+              <a:t> </a:t>
+            </a:r>
+            <a:r>
+              <a:rPr lang="en-US" sz="2400" dirty="0" smtClean="0">
+                <a:solidFill>
+                  <a:schemeClr val="tx1"/>
+                </a:solidFill>
+              </a:rPr>
+              <a:t/>
             </a:r>
             <a:br>
               <a:rPr lang="en-US" sz="2400" dirty="0" smtClean="0">
@@ -13244,7 +13276,23 @@
                   <a:schemeClr val="tx1"/>
                 </a:solidFill>
               </a:rPr>
-              <a:t>P4-16 </a:t>
+              <a:t>P4</a:t>
+            </a:r>
+            <a:r>
+              <a:rPr lang="en-US" sz="2400" baseline="-25000" dirty="0" smtClean="0">
+                <a:solidFill>
+                  <a:schemeClr val="tx1"/>
+                </a:solidFill>
+              </a:rPr>
+              <a:t>16</a:t>
+            </a:r>
+            <a:r>
+              <a:rPr lang="en-US" sz="2400" dirty="0" smtClean="0">
+                <a:solidFill>
+                  <a:schemeClr val="tx1"/>
+                </a:solidFill>
+              </a:rPr>
+              <a:t> </a:t>
             </a:r>
             <a:r>
               <a:rPr lang="en-US" sz="2400" dirty="0">

</xml_diff>

<commit_message>
add packet filter figure to PPT
</commit_message>
<xml_diff>
--- a/p4-16/spec/P4-16-draft-spec.pptx
+++ b/p4-16/spec/P4-16-draft-spec.pptx
@@ -5,7 +5,7 @@
     <p:sldMasterId id="2147483648" r:id="rId1"/>
   </p:sldMasterIdLst>
   <p:notesMasterIdLst>
-    <p:notesMasterId r:id="rId21"/>
+    <p:notesMasterId r:id="rId22"/>
   </p:notesMasterIdLst>
   <p:sldIdLst>
     <p:sldId id="256" r:id="rId2"/>
@@ -25,8 +25,9 @@
     <p:sldId id="275" r:id="rId16"/>
     <p:sldId id="276" r:id="rId17"/>
     <p:sldId id="279" r:id="rId18"/>
-    <p:sldId id="280" r:id="rId19"/>
-    <p:sldId id="282" r:id="rId20"/>
+    <p:sldId id="283" r:id="rId19"/>
+    <p:sldId id="280" r:id="rId20"/>
+    <p:sldId id="282" r:id="rId21"/>
   </p:sldIdLst>
   <p:sldSz cx="9144000" cy="6858000" type="screen4x3"/>
   <p:notesSz cx="6858000" cy="9144000"/>
@@ -226,7 +227,7 @@
           <a:p>
             <a:fld id="{DED3B27D-5B62-AC40-B6AC-59B5C583BAA4}" type="datetimeFigureOut">
               <a:rPr lang="en-US" smtClean="0"/>
-              <a:t>10/19/2016</a:t>
+              <a:t>10/23/16</a:t>
             </a:fld>
             <a:endParaRPr lang="en-US"/>
           </a:p>
@@ -672,7 +673,7 @@
           <a:p>
             <a:fld id="{E5FA88D9-A900-BE49-8FB1-39E9E0AFC9E6}" type="datetimeFigureOut">
               <a:rPr lang="en-US" smtClean="0"/>
-              <a:t>10/19/2016</a:t>
+              <a:t>10/23/16</a:t>
             </a:fld>
             <a:endParaRPr lang="en-US"/>
           </a:p>
@@ -840,7 +841,7 @@
           <a:p>
             <a:fld id="{E5FA88D9-A900-BE49-8FB1-39E9E0AFC9E6}" type="datetimeFigureOut">
               <a:rPr lang="en-US" smtClean="0"/>
-              <a:t>10/19/2016</a:t>
+              <a:t>10/23/16</a:t>
             </a:fld>
             <a:endParaRPr lang="en-US"/>
           </a:p>
@@ -1018,7 +1019,7 @@
           <a:p>
             <a:fld id="{E5FA88D9-A900-BE49-8FB1-39E9E0AFC9E6}" type="datetimeFigureOut">
               <a:rPr lang="en-US" smtClean="0"/>
-              <a:t>10/19/2016</a:t>
+              <a:t>10/23/16</a:t>
             </a:fld>
             <a:endParaRPr lang="en-US"/>
           </a:p>
@@ -1186,7 +1187,7 @@
           <a:p>
             <a:fld id="{E5FA88D9-A900-BE49-8FB1-39E9E0AFC9E6}" type="datetimeFigureOut">
               <a:rPr lang="en-US" smtClean="0"/>
-              <a:t>10/19/2016</a:t>
+              <a:t>10/23/16</a:t>
             </a:fld>
             <a:endParaRPr lang="en-US"/>
           </a:p>
@@ -1431,7 +1432,7 @@
           <a:p>
             <a:fld id="{E5FA88D9-A900-BE49-8FB1-39E9E0AFC9E6}" type="datetimeFigureOut">
               <a:rPr lang="en-US" smtClean="0"/>
-              <a:t>10/19/2016</a:t>
+              <a:t>10/23/16</a:t>
             </a:fld>
             <a:endParaRPr lang="en-US"/>
           </a:p>
@@ -1716,7 +1717,7 @@
           <a:p>
             <a:fld id="{E5FA88D9-A900-BE49-8FB1-39E9E0AFC9E6}" type="datetimeFigureOut">
               <a:rPr lang="en-US" smtClean="0"/>
-              <a:t>10/19/2016</a:t>
+              <a:t>10/23/16</a:t>
             </a:fld>
             <a:endParaRPr lang="en-US"/>
           </a:p>
@@ -2135,7 +2136,7 @@
           <a:p>
             <a:fld id="{E5FA88D9-A900-BE49-8FB1-39E9E0AFC9E6}" type="datetimeFigureOut">
               <a:rPr lang="en-US" smtClean="0"/>
-              <a:t>10/19/2016</a:t>
+              <a:t>10/23/16</a:t>
             </a:fld>
             <a:endParaRPr lang="en-US"/>
           </a:p>
@@ -2252,7 +2253,7 @@
           <a:p>
             <a:fld id="{E5FA88D9-A900-BE49-8FB1-39E9E0AFC9E6}" type="datetimeFigureOut">
               <a:rPr lang="en-US" smtClean="0"/>
-              <a:t>10/19/2016</a:t>
+              <a:t>10/23/16</a:t>
             </a:fld>
             <a:endParaRPr lang="en-US"/>
           </a:p>
@@ -2347,7 +2348,7 @@
           <a:p>
             <a:fld id="{E5FA88D9-A900-BE49-8FB1-39E9E0AFC9E6}" type="datetimeFigureOut">
               <a:rPr lang="en-US" smtClean="0"/>
-              <a:t>10/19/2016</a:t>
+              <a:t>10/23/16</a:t>
             </a:fld>
             <a:endParaRPr lang="en-US"/>
           </a:p>
@@ -2622,7 +2623,7 @@
           <a:p>
             <a:fld id="{E5FA88D9-A900-BE49-8FB1-39E9E0AFC9E6}" type="datetimeFigureOut">
               <a:rPr lang="en-US" smtClean="0"/>
-              <a:t>10/19/2016</a:t>
+              <a:t>10/23/16</a:t>
             </a:fld>
             <a:endParaRPr lang="en-US"/>
           </a:p>
@@ -2874,7 +2875,7 @@
           <a:p>
             <a:fld id="{E5FA88D9-A900-BE49-8FB1-39E9E0AFC9E6}" type="datetimeFigureOut">
               <a:rPr lang="en-US" smtClean="0"/>
-              <a:t>10/19/2016</a:t>
+              <a:t>10/23/16</a:t>
             </a:fld>
             <a:endParaRPr lang="en-US"/>
           </a:p>
@@ -3085,7 +3086,7 @@
           <a:p>
             <a:fld id="{E5FA88D9-A900-BE49-8FB1-39E9E0AFC9E6}" type="datetimeFigureOut">
               <a:rPr lang="en-US" smtClean="0"/>
-              <a:t>10/19/2016</a:t>
+              <a:t>10/23/16</a:t>
             </a:fld>
             <a:endParaRPr lang="en-US"/>
           </a:p>
@@ -7028,7 +7029,7 @@
           <p:nvPr>
             <p:extLst>
               <p:ext uri="{D42A27DB-BD31-4B8C-83A1-F6EECF244321}">
-                <p14:modId xmlns:p14="http://schemas.microsoft.com/office/powerpoint/2010/main" val="481937990"/>
+                <p14:modId xmlns:p14="http://schemas.microsoft.com/office/powerpoint/2010/main" val="985297046"/>
               </p:ext>
             </p:extLst>
           </p:nvPr>
@@ -7047,14 +7048,14 @@
                 <a:gridCol w="1207821">
                   <a:extLst>
                     <a:ext uri="{9D8B030D-6E8A-4147-A177-3AD203B41FA5}">
-                      <a16:colId xmlns:a16="http://schemas.microsoft.com/office/drawing/2014/main" val="20000"/>
+                      <a16:colId xmlns:a16="http://schemas.microsoft.com/office/drawing/2014/main" xmlns="" val="20000"/>
                     </a:ext>
                   </a:extLst>
                 </a:gridCol>
                 <a:gridCol w="1233947">
                   <a:extLst>
                     <a:ext uri="{9D8B030D-6E8A-4147-A177-3AD203B41FA5}">
-                      <a16:colId xmlns:a16="http://schemas.microsoft.com/office/drawing/2014/main" val="20001"/>
+                      <a16:colId xmlns:a16="http://schemas.microsoft.com/office/drawing/2014/main" xmlns="" val="20001"/>
                     </a:ext>
                   </a:extLst>
                 </a:gridCol>
@@ -7088,7 +7089,7 @@
                 </a:tc>
                 <a:extLst>
                   <a:ext uri="{0D108BD9-81ED-4DB2-BD59-A6C34878D82A}">
-                    <a16:rowId xmlns:a16="http://schemas.microsoft.com/office/drawing/2014/main" val="10000"/>
+                    <a16:rowId xmlns:a16="http://schemas.microsoft.com/office/drawing/2014/main" xmlns="" val="10000"/>
                   </a:ext>
                 </a:extLst>
               </a:tr>
@@ -7115,7 +7116,7 @@
                 </a:tc>
                 <a:extLst>
                   <a:ext uri="{0D108BD9-81ED-4DB2-BD59-A6C34878D82A}">
-                    <a16:rowId xmlns:a16="http://schemas.microsoft.com/office/drawing/2014/main" val="10001"/>
+                    <a16:rowId xmlns:a16="http://schemas.microsoft.com/office/drawing/2014/main" xmlns="" val="10001"/>
                   </a:ext>
                 </a:extLst>
               </a:tr>
@@ -7142,7 +7143,7 @@
                 </a:tc>
                 <a:extLst>
                   <a:ext uri="{0D108BD9-81ED-4DB2-BD59-A6C34878D82A}">
-                    <a16:rowId xmlns:a16="http://schemas.microsoft.com/office/drawing/2014/main" val="10002"/>
+                    <a16:rowId xmlns:a16="http://schemas.microsoft.com/office/drawing/2014/main" xmlns="" val="10002"/>
                   </a:ext>
                 </a:extLst>
               </a:tr>
@@ -7181,7 +7182,7 @@
                 </a:tc>
                 <a:extLst>
                   <a:ext uri="{0D108BD9-81ED-4DB2-BD59-A6C34878D82A}">
-                    <a16:rowId xmlns:a16="http://schemas.microsoft.com/office/drawing/2014/main" val="10003"/>
+                    <a16:rowId xmlns:a16="http://schemas.microsoft.com/office/drawing/2014/main" xmlns="" val="10003"/>
                   </a:ext>
                 </a:extLst>
               </a:tr>
@@ -7208,7 +7209,7 @@
                 </a:tc>
                 <a:extLst>
                   <a:ext uri="{0D108BD9-81ED-4DB2-BD59-A6C34878D82A}">
-                    <a16:rowId xmlns:a16="http://schemas.microsoft.com/office/drawing/2014/main" val="10004"/>
+                    <a16:rowId xmlns:a16="http://schemas.microsoft.com/office/drawing/2014/main" xmlns="" val="10004"/>
                   </a:ext>
                 </a:extLst>
               </a:tr>
@@ -7235,7 +7236,7 @@
                 </a:tc>
                 <a:extLst>
                   <a:ext uri="{0D108BD9-81ED-4DB2-BD59-A6C34878D82A}">
-                    <a16:rowId xmlns:a16="http://schemas.microsoft.com/office/drawing/2014/main" val="10005"/>
+                    <a16:rowId xmlns:a16="http://schemas.microsoft.com/office/drawing/2014/main" xmlns="" val="10005"/>
                   </a:ext>
                 </a:extLst>
               </a:tr>
@@ -11736,14 +11737,74 @@
       </p:grpSpPr>
       <p:sp>
         <p:nvSpPr>
-          <p:cNvPr id="2" name="Rectangle 1"/>
-          <p:cNvSpPr/>
-          <p:nvPr/>
-        </p:nvSpPr>
-        <p:spPr>
-          <a:xfrm>
-            <a:off x="1799304" y="1666567"/>
-            <a:ext cx="4114800" cy="3937820"/>
+          <p:cNvPr id="4" name="Rectangle 3"/>
+          <p:cNvSpPr/>
+          <p:nvPr/>
+        </p:nvSpPr>
+        <p:spPr>
+          <a:xfrm>
+            <a:off x="5613991" y="2052084"/>
+            <a:ext cx="1669311" cy="1233376"/>
+          </a:xfrm>
+          <a:prstGeom prst="rect">
+            <a:avLst/>
+          </a:prstGeom>
+          <a:solidFill>
+            <a:schemeClr val="tx2">
+              <a:lumMod val="20000"/>
+              <a:lumOff val="80000"/>
+            </a:schemeClr>
+          </a:solidFill>
+          <a:ln w="38100" cmpd="sng">
+            <a:noFill/>
+          </a:ln>
+          <a:effectLst/>
+        </p:spPr>
+        <p:style>
+          <a:lnRef idx="1">
+            <a:schemeClr val="accent1"/>
+          </a:lnRef>
+          <a:fillRef idx="3">
+            <a:schemeClr val="accent1"/>
+          </a:fillRef>
+          <a:effectRef idx="2">
+            <a:schemeClr val="accent1"/>
+          </a:effectRef>
+          <a:fontRef idx="minor">
+            <a:schemeClr val="lt1"/>
+          </a:fontRef>
+        </p:style>
+        <p:txBody>
+          <a:bodyPr wrap="none" rtlCol="0" anchor="ctr"/>
+          <a:lstStyle/>
+          <a:p>
+            <a:pPr algn="ctr"/>
+            <a:r>
+              <a:rPr lang="en-US" sz="3200" dirty="0" smtClean="0">
+                <a:solidFill>
+                  <a:schemeClr val="tx1"/>
+                </a:solidFill>
+              </a:rPr>
+              <a:t>drop?</a:t>
+            </a:r>
+            <a:endParaRPr lang="en-US" sz="3200" dirty="0" smtClean="0">
+              <a:solidFill>
+                <a:schemeClr val="tx1"/>
+              </a:solidFill>
+            </a:endParaRPr>
+          </a:p>
+        </p:txBody>
+      </p:sp>
+      <p:sp>
+        <p:nvSpPr>
+          <p:cNvPr id="6" name="Rectangle 5"/>
+          <p:cNvSpPr/>
+          <p:nvPr/>
+        </p:nvSpPr>
+        <p:spPr>
+          <a:xfrm>
+            <a:off x="2445488" y="2052084"/>
+            <a:ext cx="1722475" cy="1233376"/>
           </a:xfrm>
           <a:prstGeom prst="rect">
             <a:avLst/>
@@ -11775,6 +11836,14 @@
           <a:lstStyle/>
           <a:p>
             <a:pPr algn="ctr"/>
+            <a:r>
+              <a:rPr lang="en-US" sz="3200" dirty="0" smtClean="0">
+                <a:solidFill>
+                  <a:schemeClr val="tx1"/>
+                </a:solidFill>
+              </a:rPr>
+              <a:t>Parser</a:t>
+            </a:r>
             <a:endParaRPr lang="en-US" sz="3200" dirty="0" smtClean="0">
               <a:solidFill>
                 <a:schemeClr val="tx1"/>
@@ -11785,57 +11854,24 @@
       </p:sp>
       <p:sp>
         <p:nvSpPr>
-          <p:cNvPr id="3" name="TextBox 2"/>
-          <p:cNvSpPr txBox="1"/>
-          <p:nvPr/>
-        </p:nvSpPr>
-        <p:spPr>
-          <a:xfrm>
-            <a:off x="1940126" y="1396860"/>
-            <a:ext cx="1895391" cy="461665"/>
-          </a:xfrm>
-          <a:prstGeom prst="rect">
+          <p:cNvPr id="8" name="Right Arrow 7"/>
+          <p:cNvSpPr/>
+          <p:nvPr/>
+        </p:nvSpPr>
+        <p:spPr>
+          <a:xfrm>
+            <a:off x="4167963" y="2509284"/>
+            <a:ext cx="1446028" cy="308344"/>
+          </a:xfrm>
+          <a:prstGeom prst="rightArrow">
             <a:avLst/>
           </a:prstGeom>
           <a:solidFill>
-            <a:schemeClr val="accent6">
-              <a:lumMod val="20000"/>
-              <a:lumOff val="80000"/>
-            </a:schemeClr>
+            <a:schemeClr val="accent2"/>
           </a:solidFill>
-        </p:spPr>
-        <p:txBody>
-          <a:bodyPr wrap="none" rtlCol="0">
-            <a:spAutoFit/>
-          </a:bodyPr>
-          <a:lstStyle/>
-          <a:p>
-            <a:r>
-              <a:rPr lang="en-US" sz="2400" dirty="0" smtClean="0"/>
-              <a:t>package main</a:t>
-            </a:r>
-            <a:endParaRPr lang="en-US" sz="2400" dirty="0"/>
-          </a:p>
-        </p:txBody>
-      </p:sp>
-      <p:sp>
-        <p:nvSpPr>
-          <p:cNvPr id="4" name="Rectangle 3"/>
-          <p:cNvSpPr/>
-          <p:nvPr/>
-        </p:nvSpPr>
-        <p:spPr>
-          <a:xfrm>
-            <a:off x="2241756" y="2020529"/>
-            <a:ext cx="3288890" cy="958645"/>
-          </a:xfrm>
-          <a:prstGeom prst="rect">
-            <a:avLst/>
-          </a:prstGeom>
-          <a:noFill/>
           <a:ln w="38100" cmpd="sng">
             <a:solidFill>
-              <a:schemeClr val="tx1"/>
+              <a:schemeClr val="accent2"/>
             </a:solidFill>
           </a:ln>
           <a:effectLst/>
@@ -11869,22 +11905,30 @@
       </p:sp>
       <p:sp>
         <p:nvSpPr>
-          <p:cNvPr id="5" name="Rectangle 4"/>
-          <p:cNvSpPr/>
-          <p:nvPr/>
-        </p:nvSpPr>
-        <p:spPr>
-          <a:xfrm>
-            <a:off x="2241756" y="3170904"/>
-            <a:ext cx="3288890" cy="958645"/>
-          </a:xfrm>
-          <a:prstGeom prst="rect">
-            <a:avLst/>
-          </a:prstGeom>
-          <a:noFill/>
+          <p:cNvPr id="9" name="Right Arrow 8"/>
+          <p:cNvSpPr/>
+          <p:nvPr/>
+        </p:nvSpPr>
+        <p:spPr>
+          <a:xfrm>
+            <a:off x="7283302" y="2392326"/>
+            <a:ext cx="754912" cy="499730"/>
+          </a:xfrm>
+          <a:prstGeom prst="rightArrow">
+            <a:avLst/>
+          </a:prstGeom>
+          <a:solidFill>
+            <a:schemeClr val="tx2">
+              <a:lumMod val="40000"/>
+              <a:lumOff val="60000"/>
+            </a:schemeClr>
+          </a:solidFill>
           <a:ln w="38100" cmpd="sng">
             <a:solidFill>
-              <a:schemeClr val="tx1"/>
+              <a:schemeClr val="tx2">
+                <a:lumMod val="60000"/>
+                <a:lumOff val="40000"/>
+              </a:schemeClr>
             </a:solidFill>
           </a:ln>
           <a:effectLst/>
@@ -11918,22 +11962,30 @@
       </p:sp>
       <p:sp>
         <p:nvSpPr>
-          <p:cNvPr id="6" name="Rectangle 5"/>
-          <p:cNvSpPr/>
-          <p:nvPr/>
-        </p:nvSpPr>
-        <p:spPr>
-          <a:xfrm>
-            <a:off x="2263877" y="4321279"/>
-            <a:ext cx="3288890" cy="958645"/>
-          </a:xfrm>
-          <a:prstGeom prst="rect">
-            <a:avLst/>
-          </a:prstGeom>
-          <a:noFill/>
+          <p:cNvPr id="10" name="Right Arrow 9"/>
+          <p:cNvSpPr/>
+          <p:nvPr/>
+        </p:nvSpPr>
+        <p:spPr>
+          <a:xfrm>
+            <a:off x="1690576" y="2360428"/>
+            <a:ext cx="754912" cy="499730"/>
+          </a:xfrm>
+          <a:prstGeom prst="rightArrow">
+            <a:avLst/>
+          </a:prstGeom>
+          <a:solidFill>
+            <a:schemeClr val="tx2">
+              <a:lumMod val="40000"/>
+              <a:lumOff val="60000"/>
+            </a:schemeClr>
+          </a:solidFill>
           <a:ln w="38100" cmpd="sng">
             <a:solidFill>
-              <a:schemeClr val="tx1"/>
+              <a:schemeClr val="tx2">
+                <a:lumMod val="60000"/>
+                <a:lumOff val="40000"/>
+              </a:schemeClr>
             </a:solidFill>
           </a:ln>
           <a:effectLst/>
@@ -11967,22 +12019,36 @@
       </p:sp>
       <p:sp>
         <p:nvSpPr>
-          <p:cNvPr id="7" name="Rectangle 6"/>
-          <p:cNvSpPr/>
-          <p:nvPr/>
-        </p:nvSpPr>
-        <p:spPr>
-          <a:xfrm>
-            <a:off x="6245942" y="2979174"/>
-            <a:ext cx="1054510" cy="1201992"/>
-          </a:xfrm>
-          <a:prstGeom prst="rect">
-            <a:avLst/>
-          </a:prstGeom>
-          <a:noFill/>
+          <p:cNvPr id="13" name="U-Turn Arrow 12"/>
+          <p:cNvSpPr/>
+          <p:nvPr/>
+        </p:nvSpPr>
+        <p:spPr>
+          <a:xfrm flipV="1">
+            <a:off x="1806766" y="2747361"/>
+            <a:ext cx="4960280" cy="1626781"/>
+          </a:xfrm>
+          <a:prstGeom prst="uturnArrow">
+            <a:avLst>
+              <a:gd name="adj1" fmla="val 13700"/>
+              <a:gd name="adj2" fmla="val 15858"/>
+              <a:gd name="adj3" fmla="val 23646"/>
+              <a:gd name="adj4" fmla="val 43750"/>
+              <a:gd name="adj5" fmla="val 65850"/>
+            </a:avLst>
+          </a:prstGeom>
+          <a:solidFill>
+            <a:schemeClr val="tx2">
+              <a:lumMod val="40000"/>
+              <a:lumOff val="60000"/>
+            </a:schemeClr>
+          </a:solidFill>
           <a:ln w="38100" cmpd="sng">
             <a:solidFill>
-              <a:schemeClr val="tx1"/>
+              <a:schemeClr val="tx2">
+                <a:lumMod val="60000"/>
+                <a:lumOff val="40000"/>
+              </a:schemeClr>
             </a:solidFill>
           </a:ln>
           <a:effectLst/>
@@ -12014,324 +12080,10 @@
           </a:p>
         </p:txBody>
       </p:sp>
-      <p:sp>
-        <p:nvSpPr>
-          <p:cNvPr id="8" name="TextBox 7"/>
-          <p:cNvSpPr txBox="1"/>
-          <p:nvPr/>
-        </p:nvSpPr>
-        <p:spPr>
-          <a:xfrm>
-            <a:off x="2337108" y="1941626"/>
-            <a:ext cx="1430905" cy="461665"/>
-          </a:xfrm>
-          <a:prstGeom prst="rect">
-            <a:avLst/>
-          </a:prstGeom>
-          <a:solidFill>
-            <a:schemeClr val="accent6">
-              <a:lumMod val="20000"/>
-              <a:lumOff val="80000"/>
-            </a:schemeClr>
-          </a:solidFill>
-        </p:spPr>
-        <p:txBody>
-          <a:bodyPr wrap="none" rtlCol="0">
-            <a:spAutoFit/>
-          </a:bodyPr>
-          <a:lstStyle/>
-          <a:p>
-            <a:r>
-              <a:rPr lang="en-US" sz="2400" dirty="0" smtClean="0"/>
-              <a:t>parser </a:t>
-            </a:r>
-            <a:r>
-              <a:rPr lang="en-US" sz="2400" dirty="0" err="1" smtClean="0"/>
-              <a:t>prs</a:t>
-            </a:r>
-            <a:endParaRPr lang="en-US" sz="2400" dirty="0"/>
-          </a:p>
-        </p:txBody>
-      </p:sp>
-      <p:sp>
-        <p:nvSpPr>
-          <p:cNvPr id="9" name="TextBox 8"/>
-          <p:cNvSpPr txBox="1"/>
-          <p:nvPr/>
-        </p:nvSpPr>
-        <p:spPr>
-          <a:xfrm>
-            <a:off x="2337108" y="4242376"/>
-            <a:ext cx="1617238" cy="461665"/>
-          </a:xfrm>
-          <a:prstGeom prst="rect">
-            <a:avLst/>
-          </a:prstGeom>
-          <a:solidFill>
-            <a:schemeClr val="accent6">
-              <a:lumMod val="20000"/>
-              <a:lumOff val="80000"/>
-            </a:schemeClr>
-          </a:solidFill>
-        </p:spPr>
-        <p:txBody>
-          <a:bodyPr wrap="none" rtlCol="0">
-            <a:spAutoFit/>
-          </a:bodyPr>
-          <a:lstStyle/>
-          <a:p>
-            <a:r>
-              <a:rPr lang="en-US" sz="2400" dirty="0" smtClean="0"/>
-              <a:t>control </a:t>
-            </a:r>
-            <a:r>
-              <a:rPr lang="en-US" sz="2400" dirty="0" err="1" smtClean="0"/>
-              <a:t>dep</a:t>
-            </a:r>
-            <a:endParaRPr lang="en-US" sz="2400" dirty="0"/>
-          </a:p>
-        </p:txBody>
-      </p:sp>
-      <p:sp>
-        <p:nvSpPr>
-          <p:cNvPr id="10" name="TextBox 9"/>
-          <p:cNvSpPr txBox="1"/>
-          <p:nvPr/>
-        </p:nvSpPr>
-        <p:spPr>
-          <a:xfrm>
-            <a:off x="2339169" y="3058077"/>
-            <a:ext cx="1549911" cy="461665"/>
-          </a:xfrm>
-          <a:prstGeom prst="rect">
-            <a:avLst/>
-          </a:prstGeom>
-          <a:solidFill>
-            <a:schemeClr val="accent6">
-              <a:lumMod val="20000"/>
-              <a:lumOff val="80000"/>
-            </a:schemeClr>
-          </a:solidFill>
-        </p:spPr>
-        <p:txBody>
-          <a:bodyPr wrap="none" rtlCol="0">
-            <a:spAutoFit/>
-          </a:bodyPr>
-          <a:lstStyle/>
-          <a:p>
-            <a:r>
-              <a:rPr lang="en-US" sz="2400" dirty="0" smtClean="0"/>
-              <a:t>control ctrl</a:t>
-            </a:r>
-            <a:endParaRPr lang="en-US" sz="2400" dirty="0"/>
-          </a:p>
-        </p:txBody>
-      </p:sp>
-      <p:sp>
-        <p:nvSpPr>
-          <p:cNvPr id="11" name="TextBox 10"/>
-          <p:cNvSpPr txBox="1"/>
-          <p:nvPr/>
-        </p:nvSpPr>
-        <p:spPr>
-          <a:xfrm>
-            <a:off x="6341010" y="2709239"/>
-            <a:ext cx="764953" cy="461665"/>
-          </a:xfrm>
-          <a:prstGeom prst="rect">
-            <a:avLst/>
-          </a:prstGeom>
-          <a:solidFill>
-            <a:schemeClr val="accent6">
-              <a:lumMod val="20000"/>
-              <a:lumOff val="80000"/>
-            </a:schemeClr>
-          </a:solidFill>
-        </p:spPr>
-        <p:txBody>
-          <a:bodyPr wrap="none" rtlCol="0">
-            <a:spAutoFit/>
-          </a:bodyPr>
-          <a:lstStyle/>
-          <a:p>
-            <a:r>
-              <a:rPr lang="en-US" sz="2400" dirty="0" smtClean="0"/>
-              <a:t>ck16</a:t>
-            </a:r>
-            <a:endParaRPr lang="en-US" sz="2400" dirty="0"/>
-          </a:p>
-        </p:txBody>
-      </p:sp>
-      <p:cxnSp>
-        <p:nvCxnSpPr>
-          <p:cNvPr id="13" name="Elbow Connector 12"/>
-          <p:cNvCxnSpPr>
-            <a:endCxn id="7" idx="1"/>
-          </p:cNvCxnSpPr>
-          <p:nvPr/>
-        </p:nvCxnSpPr>
-        <p:spPr>
-          <a:xfrm>
-            <a:off x="4159355" y="2446870"/>
-            <a:ext cx="2086587" cy="1133300"/>
-          </a:xfrm>
-          <a:prstGeom prst="bentConnector3">
-            <a:avLst>
-              <a:gd name="adj1" fmla="val 91761"/>
-            </a:avLst>
-          </a:prstGeom>
-          <a:ln w="28575" cmpd="sng">
-            <a:solidFill>
-              <a:srgbClr val="000000"/>
-            </a:solidFill>
-            <a:tailEnd type="triangle"/>
-          </a:ln>
-          <a:effectLst/>
-        </p:spPr>
-        <p:style>
-          <a:lnRef idx="2">
-            <a:schemeClr val="accent1"/>
-          </a:lnRef>
-          <a:fillRef idx="0">
-            <a:schemeClr val="accent1"/>
-          </a:fillRef>
-          <a:effectRef idx="1">
-            <a:schemeClr val="accent1"/>
-          </a:effectRef>
-          <a:fontRef idx="minor">
-            <a:schemeClr val="tx1"/>
-          </a:fontRef>
-        </p:style>
-      </p:cxnSp>
-      <p:cxnSp>
-        <p:nvCxnSpPr>
-          <p:cNvPr id="15" name="Elbow Connector 14"/>
-          <p:cNvCxnSpPr>
-            <a:endCxn id="7" idx="1"/>
-          </p:cNvCxnSpPr>
-          <p:nvPr/>
-        </p:nvCxnSpPr>
-        <p:spPr>
-          <a:xfrm flipV="1">
-            <a:off x="4378362" y="3580170"/>
-            <a:ext cx="1867580" cy="1256345"/>
-          </a:xfrm>
-          <a:prstGeom prst="bentConnector3">
-            <a:avLst>
-              <a:gd name="adj1" fmla="val 90897"/>
-            </a:avLst>
-          </a:prstGeom>
-          <a:ln w="28575" cmpd="sng">
-            <a:solidFill>
-              <a:srgbClr val="000000"/>
-            </a:solidFill>
-            <a:tailEnd type="triangle"/>
-          </a:ln>
-          <a:effectLst/>
-        </p:spPr>
-        <p:style>
-          <a:lnRef idx="2">
-            <a:schemeClr val="accent1"/>
-          </a:lnRef>
-          <a:fillRef idx="0">
-            <a:schemeClr val="accent1"/>
-          </a:fillRef>
-          <a:effectRef idx="1">
-            <a:schemeClr val="accent1"/>
-          </a:effectRef>
-          <a:fontRef idx="minor">
-            <a:schemeClr val="tx1"/>
-          </a:fontRef>
-        </p:style>
-      </p:cxnSp>
-      <p:sp>
-        <p:nvSpPr>
-          <p:cNvPr id="14" name="Rectangle 13"/>
-          <p:cNvSpPr/>
-          <p:nvPr/>
-        </p:nvSpPr>
-        <p:spPr>
-          <a:xfrm>
-            <a:off x="1398494" y="1011218"/>
-            <a:ext cx="6164132" cy="4765637"/>
-          </a:xfrm>
-          <a:prstGeom prst="rect">
-            <a:avLst/>
-          </a:prstGeom>
-          <a:noFill/>
-          <a:ln w="38100" cmpd="sng">
-            <a:solidFill>
-              <a:schemeClr val="tx1"/>
-            </a:solidFill>
-          </a:ln>
-          <a:effectLst/>
-        </p:spPr>
-        <p:style>
-          <a:lnRef idx="1">
-            <a:schemeClr val="accent1"/>
-          </a:lnRef>
-          <a:fillRef idx="3">
-            <a:schemeClr val="accent1"/>
-          </a:fillRef>
-          <a:effectRef idx="2">
-            <a:schemeClr val="accent1"/>
-          </a:effectRef>
-          <a:fontRef idx="minor">
-            <a:schemeClr val="lt1"/>
-          </a:fontRef>
-        </p:style>
-        <p:txBody>
-          <a:bodyPr wrap="none" rtlCol="0" anchor="ctr"/>
-          <a:lstStyle/>
-          <a:p>
-            <a:pPr algn="ctr"/>
-            <a:endParaRPr lang="en-US" sz="3200" dirty="0" smtClean="0">
-              <a:solidFill>
-                <a:schemeClr val="tx1"/>
-              </a:solidFill>
-            </a:endParaRPr>
-          </a:p>
-        </p:txBody>
-      </p:sp>
-      <p:sp>
-        <p:nvSpPr>
-          <p:cNvPr id="16" name="TextBox 15"/>
-          <p:cNvSpPr txBox="1"/>
-          <p:nvPr/>
-        </p:nvSpPr>
-        <p:spPr>
-          <a:xfrm>
-            <a:off x="1527586" y="761167"/>
-            <a:ext cx="1192634" cy="461665"/>
-          </a:xfrm>
-          <a:prstGeom prst="rect">
-            <a:avLst/>
-          </a:prstGeom>
-          <a:solidFill>
-            <a:schemeClr val="accent6">
-              <a:lumMod val="20000"/>
-              <a:lumOff val="80000"/>
-            </a:schemeClr>
-          </a:solidFill>
-        </p:spPr>
-        <p:txBody>
-          <a:bodyPr wrap="none" rtlCol="0">
-            <a:spAutoFit/>
-          </a:bodyPr>
-          <a:lstStyle/>
-          <a:p>
-            <a:r>
-              <a:rPr lang="en-US" sz="2400" i="1" dirty="0" err="1" smtClean="0"/>
-              <a:t>toplevel</a:t>
-            </a:r>
-            <a:endParaRPr lang="en-US" sz="2400" i="1" dirty="0"/>
-          </a:p>
-        </p:txBody>
-      </p:sp>
     </p:spTree>
     <p:extLst>
       <p:ext uri="{BB962C8B-B14F-4D97-AF65-F5344CB8AC3E}">
-        <p14:creationId xmlns:p14="http://schemas.microsoft.com/office/powerpoint/2010/main" val="2002696447"/>
+        <p14:creationId xmlns:p14="http://schemas.microsoft.com/office/powerpoint/2010/main" val="203657736"/>
       </p:ext>
     </p:extLst>
   </p:cSld>
@@ -12415,7 +12167,7 @@
         </p:nvSpPr>
         <p:spPr>
           <a:xfrm>
-            <a:off x="1941143" y="1358192"/>
+            <a:off x="1940126" y="1396860"/>
             <a:ext cx="1895391" cy="461665"/>
           </a:xfrm>
           <a:prstGeom prst="rect">
@@ -12450,8 +12202,8 @@
         </p:nvSpPr>
         <p:spPr>
           <a:xfrm>
-            <a:off x="2241756" y="2233425"/>
-            <a:ext cx="3288890" cy="3156155"/>
+            <a:off x="2241756" y="2020529"/>
+            <a:ext cx="3288890" cy="958645"/>
           </a:xfrm>
           <a:prstGeom prst="rect">
             <a:avLst/>
@@ -12493,49 +12245,14 @@
       </p:sp>
       <p:sp>
         <p:nvSpPr>
-          <p:cNvPr id="8" name="TextBox 7"/>
-          <p:cNvSpPr txBox="1"/>
-          <p:nvPr/>
-        </p:nvSpPr>
-        <p:spPr>
-          <a:xfrm>
-            <a:off x="2420178" y="1937602"/>
-            <a:ext cx="1259768" cy="461665"/>
-          </a:xfrm>
-          <a:prstGeom prst="rect">
-            <a:avLst/>
-          </a:prstGeom>
-          <a:solidFill>
-            <a:schemeClr val="accent6">
-              <a:lumMod val="20000"/>
-              <a:lumOff val="80000"/>
-            </a:schemeClr>
-          </a:solidFill>
-        </p:spPr>
-        <p:txBody>
-          <a:bodyPr wrap="none" rtlCol="0">
-            <a:spAutoFit/>
-          </a:bodyPr>
-          <a:lstStyle/>
-          <a:p>
-            <a:r>
-              <a:rPr lang="en-US" sz="2400" dirty="0" smtClean="0"/>
-              <a:t>control s</a:t>
-            </a:r>
-            <a:endParaRPr lang="en-US" sz="2400" dirty="0"/>
-          </a:p>
-        </p:txBody>
-      </p:sp>
-      <p:sp>
-        <p:nvSpPr>
-          <p:cNvPr id="14" name="Rectangle 13"/>
-          <p:cNvSpPr/>
-          <p:nvPr/>
-        </p:nvSpPr>
-        <p:spPr>
-          <a:xfrm>
-            <a:off x="1398494" y="1011218"/>
-            <a:ext cx="4905487" cy="4765637"/>
+          <p:cNvPr id="5" name="Rectangle 4"/>
+          <p:cNvSpPr/>
+          <p:nvPr/>
+        </p:nvSpPr>
+        <p:spPr>
+          <a:xfrm>
+            <a:off x="2241756" y="3170904"/>
+            <a:ext cx="3288890" cy="958645"/>
           </a:xfrm>
           <a:prstGeom prst="rect">
             <a:avLst/>
@@ -12577,49 +12294,14 @@
       </p:sp>
       <p:sp>
         <p:nvSpPr>
-          <p:cNvPr id="16" name="TextBox 15"/>
-          <p:cNvSpPr txBox="1"/>
-          <p:nvPr/>
-        </p:nvSpPr>
-        <p:spPr>
-          <a:xfrm>
-            <a:off x="1508728" y="706603"/>
-            <a:ext cx="1192634" cy="461665"/>
-          </a:xfrm>
-          <a:prstGeom prst="rect">
-            <a:avLst/>
-          </a:prstGeom>
-          <a:solidFill>
-            <a:schemeClr val="accent6">
-              <a:lumMod val="20000"/>
-              <a:lumOff val="80000"/>
-            </a:schemeClr>
-          </a:solidFill>
-        </p:spPr>
-        <p:txBody>
-          <a:bodyPr wrap="none" rtlCol="0">
-            <a:spAutoFit/>
-          </a:bodyPr>
-          <a:lstStyle/>
-          <a:p>
-            <a:r>
-              <a:rPr lang="en-US" sz="2400" i="1" dirty="0" err="1" smtClean="0"/>
-              <a:t>toplevel</a:t>
-            </a:r>
-            <a:endParaRPr lang="en-US" sz="2400" i="1" dirty="0"/>
-          </a:p>
-        </p:txBody>
-      </p:sp>
-      <p:sp>
-        <p:nvSpPr>
-          <p:cNvPr id="17" name="Rectangle 16"/>
-          <p:cNvSpPr/>
-          <p:nvPr/>
-        </p:nvSpPr>
-        <p:spPr>
-          <a:xfrm>
-            <a:off x="2455609" y="2578087"/>
-            <a:ext cx="2761850" cy="1133301"/>
+          <p:cNvPr id="6" name="Rectangle 5"/>
+          <p:cNvSpPr/>
+          <p:nvPr/>
+        </p:nvSpPr>
+        <p:spPr>
+          <a:xfrm>
+            <a:off x="2263877" y="4321279"/>
+            <a:ext cx="3288890" cy="958645"/>
           </a:xfrm>
           <a:prstGeom prst="rect">
             <a:avLst/>
@@ -12661,14 +12343,14 @@
       </p:sp>
       <p:sp>
         <p:nvSpPr>
-          <p:cNvPr id="18" name="Rectangle 17"/>
-          <p:cNvSpPr/>
-          <p:nvPr/>
-        </p:nvSpPr>
-        <p:spPr>
-          <a:xfrm>
-            <a:off x="3986382" y="2745726"/>
-            <a:ext cx="1112743" cy="798021"/>
+          <p:cNvPr id="7" name="Rectangle 6"/>
+          <p:cNvSpPr/>
+          <p:nvPr/>
+        </p:nvSpPr>
+        <p:spPr>
+          <a:xfrm>
+            <a:off x="6245942" y="2979174"/>
+            <a:ext cx="1054510" cy="1201992"/>
           </a:xfrm>
           <a:prstGeom prst="rect">
             <a:avLst/>
@@ -12710,14 +12392,14 @@
       </p:sp>
       <p:sp>
         <p:nvSpPr>
-          <p:cNvPr id="19" name="TextBox 18"/>
+          <p:cNvPr id="8" name="TextBox 7"/>
           <p:cNvSpPr txBox="1"/>
           <p:nvPr/>
         </p:nvSpPr>
         <p:spPr>
           <a:xfrm>
-            <a:off x="2508557" y="2504592"/>
-            <a:ext cx="1424877" cy="461665"/>
+            <a:off x="2337108" y="1941626"/>
+            <a:ext cx="1430905" cy="461665"/>
           </a:xfrm>
           <a:prstGeom prst="rect">
             <a:avLst/>
@@ -12737,7 +12419,11 @@
           <a:p>
             <a:r>
               <a:rPr lang="en-US" sz="2400" dirty="0" smtClean="0"/>
-              <a:t>control c1</a:t>
+              <a:t>parser </a:t>
+            </a:r>
+            <a:r>
+              <a:rPr lang="en-US" sz="2400" dirty="0" err="1" smtClean="0"/>
+              <a:t>prs</a:t>
             </a:r>
             <a:endParaRPr lang="en-US" sz="2400" dirty="0"/>
           </a:p>
@@ -12745,14 +12431,14 @@
       </p:sp>
       <p:sp>
         <p:nvSpPr>
-          <p:cNvPr id="20" name="TextBox 19"/>
+          <p:cNvPr id="9" name="TextBox 8"/>
           <p:cNvSpPr txBox="1"/>
           <p:nvPr/>
         </p:nvSpPr>
         <p:spPr>
           <a:xfrm>
-            <a:off x="4048323" y="2654301"/>
-            <a:ext cx="988860" cy="461665"/>
+            <a:off x="2337108" y="4242376"/>
+            <a:ext cx="1617238" cy="461665"/>
           </a:xfrm>
           <a:prstGeom prst="rect">
             <a:avLst/>
@@ -12772,7 +12458,11 @@
           <a:p>
             <a:r>
               <a:rPr lang="en-US" sz="2400" dirty="0" smtClean="0"/>
-              <a:t>table t</a:t>
+              <a:t>control </a:t>
+            </a:r>
+            <a:r>
+              <a:rPr lang="en-US" sz="2400" dirty="0" err="1" smtClean="0"/>
+              <a:t>dep</a:t>
             </a:r>
             <a:endParaRPr lang="en-US" sz="2400" dirty="0"/>
           </a:p>
@@ -12780,14 +12470,166 @@
       </p:sp>
       <p:sp>
         <p:nvSpPr>
-          <p:cNvPr id="21" name="Rectangle 20"/>
-          <p:cNvSpPr/>
-          <p:nvPr/>
-        </p:nvSpPr>
-        <p:spPr>
-          <a:xfrm>
-            <a:off x="2455609" y="3990670"/>
-            <a:ext cx="2761850" cy="1133301"/>
+          <p:cNvPr id="10" name="TextBox 9"/>
+          <p:cNvSpPr txBox="1"/>
+          <p:nvPr/>
+        </p:nvSpPr>
+        <p:spPr>
+          <a:xfrm>
+            <a:off x="2339169" y="3058077"/>
+            <a:ext cx="1549911" cy="461665"/>
+          </a:xfrm>
+          <a:prstGeom prst="rect">
+            <a:avLst/>
+          </a:prstGeom>
+          <a:solidFill>
+            <a:schemeClr val="accent6">
+              <a:lumMod val="20000"/>
+              <a:lumOff val="80000"/>
+            </a:schemeClr>
+          </a:solidFill>
+        </p:spPr>
+        <p:txBody>
+          <a:bodyPr wrap="none" rtlCol="0">
+            <a:spAutoFit/>
+          </a:bodyPr>
+          <a:lstStyle/>
+          <a:p>
+            <a:r>
+              <a:rPr lang="en-US" sz="2400" dirty="0" smtClean="0"/>
+              <a:t>control ctrl</a:t>
+            </a:r>
+            <a:endParaRPr lang="en-US" sz="2400" dirty="0"/>
+          </a:p>
+        </p:txBody>
+      </p:sp>
+      <p:sp>
+        <p:nvSpPr>
+          <p:cNvPr id="11" name="TextBox 10"/>
+          <p:cNvSpPr txBox="1"/>
+          <p:nvPr/>
+        </p:nvSpPr>
+        <p:spPr>
+          <a:xfrm>
+            <a:off x="6341010" y="2709239"/>
+            <a:ext cx="764953" cy="461665"/>
+          </a:xfrm>
+          <a:prstGeom prst="rect">
+            <a:avLst/>
+          </a:prstGeom>
+          <a:solidFill>
+            <a:schemeClr val="accent6">
+              <a:lumMod val="20000"/>
+              <a:lumOff val="80000"/>
+            </a:schemeClr>
+          </a:solidFill>
+        </p:spPr>
+        <p:txBody>
+          <a:bodyPr wrap="none" rtlCol="0">
+            <a:spAutoFit/>
+          </a:bodyPr>
+          <a:lstStyle/>
+          <a:p>
+            <a:r>
+              <a:rPr lang="en-US" sz="2400" dirty="0" smtClean="0"/>
+              <a:t>ck16</a:t>
+            </a:r>
+            <a:endParaRPr lang="en-US" sz="2400" dirty="0"/>
+          </a:p>
+        </p:txBody>
+      </p:sp>
+      <p:cxnSp>
+        <p:nvCxnSpPr>
+          <p:cNvPr id="13" name="Elbow Connector 12"/>
+          <p:cNvCxnSpPr>
+            <a:endCxn id="7" idx="1"/>
+          </p:cNvCxnSpPr>
+          <p:nvPr/>
+        </p:nvCxnSpPr>
+        <p:spPr>
+          <a:xfrm>
+            <a:off x="4159355" y="2446870"/>
+            <a:ext cx="2086587" cy="1133300"/>
+          </a:xfrm>
+          <a:prstGeom prst="bentConnector3">
+            <a:avLst>
+              <a:gd name="adj1" fmla="val 91761"/>
+            </a:avLst>
+          </a:prstGeom>
+          <a:ln w="28575" cmpd="sng">
+            <a:solidFill>
+              <a:srgbClr val="000000"/>
+            </a:solidFill>
+            <a:tailEnd type="triangle"/>
+          </a:ln>
+          <a:effectLst/>
+        </p:spPr>
+        <p:style>
+          <a:lnRef idx="2">
+            <a:schemeClr val="accent1"/>
+          </a:lnRef>
+          <a:fillRef idx="0">
+            <a:schemeClr val="accent1"/>
+          </a:fillRef>
+          <a:effectRef idx="1">
+            <a:schemeClr val="accent1"/>
+          </a:effectRef>
+          <a:fontRef idx="minor">
+            <a:schemeClr val="tx1"/>
+          </a:fontRef>
+        </p:style>
+      </p:cxnSp>
+      <p:cxnSp>
+        <p:nvCxnSpPr>
+          <p:cNvPr id="15" name="Elbow Connector 14"/>
+          <p:cNvCxnSpPr>
+            <a:endCxn id="7" idx="1"/>
+          </p:cNvCxnSpPr>
+          <p:nvPr/>
+        </p:nvCxnSpPr>
+        <p:spPr>
+          <a:xfrm flipV="1">
+            <a:off x="4378362" y="3580170"/>
+            <a:ext cx="1867580" cy="1256345"/>
+          </a:xfrm>
+          <a:prstGeom prst="bentConnector3">
+            <a:avLst>
+              <a:gd name="adj1" fmla="val 90897"/>
+            </a:avLst>
+          </a:prstGeom>
+          <a:ln w="28575" cmpd="sng">
+            <a:solidFill>
+              <a:srgbClr val="000000"/>
+            </a:solidFill>
+            <a:tailEnd type="triangle"/>
+          </a:ln>
+          <a:effectLst/>
+        </p:spPr>
+        <p:style>
+          <a:lnRef idx="2">
+            <a:schemeClr val="accent1"/>
+          </a:lnRef>
+          <a:fillRef idx="0">
+            <a:schemeClr val="accent1"/>
+          </a:fillRef>
+          <a:effectRef idx="1">
+            <a:schemeClr val="accent1"/>
+          </a:effectRef>
+          <a:fontRef idx="minor">
+            <a:schemeClr val="tx1"/>
+          </a:fontRef>
+        </p:style>
+      </p:cxnSp>
+      <p:sp>
+        <p:nvSpPr>
+          <p:cNvPr id="14" name="Rectangle 13"/>
+          <p:cNvSpPr/>
+          <p:nvPr/>
+        </p:nvSpPr>
+        <p:spPr>
+          <a:xfrm>
+            <a:off x="1398494" y="1011218"/>
+            <a:ext cx="6164132" cy="4765637"/>
           </a:xfrm>
           <a:prstGeom prst="rect">
             <a:avLst/>
@@ -12829,63 +12671,14 @@
       </p:sp>
       <p:sp>
         <p:nvSpPr>
-          <p:cNvPr id="22" name="Rectangle 21"/>
-          <p:cNvSpPr/>
-          <p:nvPr/>
-        </p:nvSpPr>
-        <p:spPr>
-          <a:xfrm>
-            <a:off x="3986382" y="4158309"/>
-            <a:ext cx="1112743" cy="798021"/>
-          </a:xfrm>
-          <a:prstGeom prst="rect">
-            <a:avLst/>
-          </a:prstGeom>
-          <a:noFill/>
-          <a:ln w="38100" cmpd="sng">
-            <a:solidFill>
-              <a:schemeClr val="tx1"/>
-            </a:solidFill>
-          </a:ln>
-          <a:effectLst/>
-        </p:spPr>
-        <p:style>
-          <a:lnRef idx="1">
-            <a:schemeClr val="accent1"/>
-          </a:lnRef>
-          <a:fillRef idx="3">
-            <a:schemeClr val="accent1"/>
-          </a:fillRef>
-          <a:effectRef idx="2">
-            <a:schemeClr val="accent1"/>
-          </a:effectRef>
-          <a:fontRef idx="minor">
-            <a:schemeClr val="lt1"/>
-          </a:fontRef>
-        </p:style>
-        <p:txBody>
-          <a:bodyPr wrap="none" rtlCol="0" anchor="ctr"/>
-          <a:lstStyle/>
-          <a:p>
-            <a:pPr algn="ctr"/>
-            <a:endParaRPr lang="en-US" sz="3200" dirty="0" smtClean="0">
-              <a:solidFill>
-                <a:schemeClr val="tx1"/>
-              </a:solidFill>
-            </a:endParaRPr>
-          </a:p>
-        </p:txBody>
-      </p:sp>
-      <p:sp>
-        <p:nvSpPr>
-          <p:cNvPr id="23" name="TextBox 22"/>
+          <p:cNvPr id="16" name="TextBox 15"/>
           <p:cNvSpPr txBox="1"/>
           <p:nvPr/>
         </p:nvSpPr>
         <p:spPr>
           <a:xfrm>
-            <a:off x="2530534" y="3862062"/>
-            <a:ext cx="1424877" cy="461665"/>
+            <a:off x="1527586" y="761167"/>
+            <a:ext cx="1192634" cy="461665"/>
           </a:xfrm>
           <a:prstGeom prst="rect">
             <a:avLst/>
@@ -12904,52 +12697,17 @@
           <a:lstStyle/>
           <a:p>
             <a:r>
-              <a:rPr lang="en-US" sz="2400" dirty="0" smtClean="0"/>
-              <a:t>control c2</a:t>
-            </a:r>
-            <a:endParaRPr lang="en-US" sz="2400" dirty="0"/>
-          </a:p>
-        </p:txBody>
-      </p:sp>
-      <p:sp>
-        <p:nvSpPr>
-          <p:cNvPr id="24" name="TextBox 23"/>
-          <p:cNvSpPr txBox="1"/>
-          <p:nvPr/>
-        </p:nvSpPr>
-        <p:spPr>
-          <a:xfrm>
-            <a:off x="4048323" y="4078002"/>
-            <a:ext cx="988860" cy="461665"/>
-          </a:xfrm>
-          <a:prstGeom prst="rect">
-            <a:avLst/>
-          </a:prstGeom>
-          <a:solidFill>
-            <a:schemeClr val="accent6">
-              <a:lumMod val="20000"/>
-              <a:lumOff val="80000"/>
-            </a:schemeClr>
-          </a:solidFill>
-        </p:spPr>
-        <p:txBody>
-          <a:bodyPr wrap="none" rtlCol="0">
-            <a:spAutoFit/>
-          </a:bodyPr>
-          <a:lstStyle/>
-          <a:p>
-            <a:r>
-              <a:rPr lang="en-US" sz="2400" dirty="0" smtClean="0"/>
-              <a:t>table t</a:t>
-            </a:r>
-            <a:endParaRPr lang="en-US" sz="2400" dirty="0"/>
+              <a:rPr lang="en-US" sz="2400" i="1" dirty="0" err="1" smtClean="0"/>
+              <a:t>toplevel</a:t>
+            </a:r>
+            <a:endParaRPr lang="en-US" sz="2400" i="1" dirty="0"/>
           </a:p>
         </p:txBody>
       </p:sp>
     </p:spTree>
     <p:extLst>
       <p:ext uri="{BB962C8B-B14F-4D97-AF65-F5344CB8AC3E}">
-        <p14:creationId xmlns:p14="http://schemas.microsoft.com/office/powerpoint/2010/main" val="1304484956"/>
+        <p14:creationId xmlns:p14="http://schemas.microsoft.com/office/powerpoint/2010/main" val="2002696447"/>
       </p:ext>
     </p:extLst>
   </p:cSld>
@@ -13163,14 +12921,6 @@
               </a:rPr>
               <a:t> </a:t>
             </a:r>
-            <a:r>
-              <a:rPr lang="en-US" sz="2400" dirty="0" smtClean="0">
-                <a:solidFill>
-                  <a:schemeClr val="tx1"/>
-                </a:solidFill>
-              </a:rPr>
-              <a:t/>
-            </a:r>
             <a:br>
               <a:rPr lang="en-US" sz="2400" dirty="0" smtClean="0">
                 <a:solidFill>
@@ -13816,6 +13566,624 @@
     <p:extLst>
       <p:ext uri="{BB962C8B-B14F-4D97-AF65-F5344CB8AC3E}">
         <p14:creationId xmlns:p14="http://schemas.microsoft.com/office/powerpoint/2010/main" val="231204894"/>
+      </p:ext>
+    </p:extLst>
+  </p:cSld>
+  <p:clrMapOvr>
+    <a:masterClrMapping/>
+  </p:clrMapOvr>
+</p:sld>
+</file>
+
+<file path=ppt/slides/slide20.xml><?xml version="1.0" encoding="utf-8"?>
+<p:sld xmlns:a="http://schemas.openxmlformats.org/drawingml/2006/main" xmlns:r="http://schemas.openxmlformats.org/officeDocument/2006/relationships" xmlns:p="http://schemas.openxmlformats.org/presentationml/2006/main">
+  <p:cSld>
+    <p:spTree>
+      <p:nvGrpSpPr>
+        <p:cNvPr id="1" name=""/>
+        <p:cNvGrpSpPr/>
+        <p:nvPr/>
+      </p:nvGrpSpPr>
+      <p:grpSpPr>
+        <a:xfrm>
+          <a:off x="0" y="0"/>
+          <a:ext cx="0" cy="0"/>
+          <a:chOff x="0" y="0"/>
+          <a:chExt cx="0" cy="0"/>
+        </a:xfrm>
+      </p:grpSpPr>
+      <p:sp>
+        <p:nvSpPr>
+          <p:cNvPr id="2" name="Rectangle 1"/>
+          <p:cNvSpPr/>
+          <p:nvPr/>
+        </p:nvSpPr>
+        <p:spPr>
+          <a:xfrm>
+            <a:off x="1799304" y="1666567"/>
+            <a:ext cx="4114800" cy="3937820"/>
+          </a:xfrm>
+          <a:prstGeom prst="rect">
+            <a:avLst/>
+          </a:prstGeom>
+          <a:noFill/>
+          <a:ln w="38100" cmpd="sng">
+            <a:solidFill>
+              <a:schemeClr val="tx1"/>
+            </a:solidFill>
+          </a:ln>
+          <a:effectLst/>
+        </p:spPr>
+        <p:style>
+          <a:lnRef idx="1">
+            <a:schemeClr val="accent1"/>
+          </a:lnRef>
+          <a:fillRef idx="3">
+            <a:schemeClr val="accent1"/>
+          </a:fillRef>
+          <a:effectRef idx="2">
+            <a:schemeClr val="accent1"/>
+          </a:effectRef>
+          <a:fontRef idx="minor">
+            <a:schemeClr val="lt1"/>
+          </a:fontRef>
+        </p:style>
+        <p:txBody>
+          <a:bodyPr wrap="none" rtlCol="0" anchor="ctr"/>
+          <a:lstStyle/>
+          <a:p>
+            <a:pPr algn="ctr"/>
+            <a:endParaRPr lang="en-US" sz="3200" dirty="0" smtClean="0">
+              <a:solidFill>
+                <a:schemeClr val="tx1"/>
+              </a:solidFill>
+            </a:endParaRPr>
+          </a:p>
+        </p:txBody>
+      </p:sp>
+      <p:sp>
+        <p:nvSpPr>
+          <p:cNvPr id="3" name="TextBox 2"/>
+          <p:cNvSpPr txBox="1"/>
+          <p:nvPr/>
+        </p:nvSpPr>
+        <p:spPr>
+          <a:xfrm>
+            <a:off x="1941143" y="1358192"/>
+            <a:ext cx="1895391" cy="461665"/>
+          </a:xfrm>
+          <a:prstGeom prst="rect">
+            <a:avLst/>
+          </a:prstGeom>
+          <a:solidFill>
+            <a:schemeClr val="accent6">
+              <a:lumMod val="20000"/>
+              <a:lumOff val="80000"/>
+            </a:schemeClr>
+          </a:solidFill>
+        </p:spPr>
+        <p:txBody>
+          <a:bodyPr wrap="none" rtlCol="0">
+            <a:spAutoFit/>
+          </a:bodyPr>
+          <a:lstStyle/>
+          <a:p>
+            <a:r>
+              <a:rPr lang="en-US" sz="2400" dirty="0" smtClean="0"/>
+              <a:t>package main</a:t>
+            </a:r>
+            <a:endParaRPr lang="en-US" sz="2400" dirty="0"/>
+          </a:p>
+        </p:txBody>
+      </p:sp>
+      <p:sp>
+        <p:nvSpPr>
+          <p:cNvPr id="4" name="Rectangle 3"/>
+          <p:cNvSpPr/>
+          <p:nvPr/>
+        </p:nvSpPr>
+        <p:spPr>
+          <a:xfrm>
+            <a:off x="2241756" y="2233425"/>
+            <a:ext cx="3288890" cy="3156155"/>
+          </a:xfrm>
+          <a:prstGeom prst="rect">
+            <a:avLst/>
+          </a:prstGeom>
+          <a:noFill/>
+          <a:ln w="38100" cmpd="sng">
+            <a:solidFill>
+              <a:schemeClr val="tx1"/>
+            </a:solidFill>
+          </a:ln>
+          <a:effectLst/>
+        </p:spPr>
+        <p:style>
+          <a:lnRef idx="1">
+            <a:schemeClr val="accent1"/>
+          </a:lnRef>
+          <a:fillRef idx="3">
+            <a:schemeClr val="accent1"/>
+          </a:fillRef>
+          <a:effectRef idx="2">
+            <a:schemeClr val="accent1"/>
+          </a:effectRef>
+          <a:fontRef idx="minor">
+            <a:schemeClr val="lt1"/>
+          </a:fontRef>
+        </p:style>
+        <p:txBody>
+          <a:bodyPr wrap="none" rtlCol="0" anchor="ctr"/>
+          <a:lstStyle/>
+          <a:p>
+            <a:pPr algn="ctr"/>
+            <a:endParaRPr lang="en-US" sz="3200" dirty="0" smtClean="0">
+              <a:solidFill>
+                <a:schemeClr val="tx1"/>
+              </a:solidFill>
+            </a:endParaRPr>
+          </a:p>
+        </p:txBody>
+      </p:sp>
+      <p:sp>
+        <p:nvSpPr>
+          <p:cNvPr id="8" name="TextBox 7"/>
+          <p:cNvSpPr txBox="1"/>
+          <p:nvPr/>
+        </p:nvSpPr>
+        <p:spPr>
+          <a:xfrm>
+            <a:off x="2420178" y="1937602"/>
+            <a:ext cx="1259768" cy="461665"/>
+          </a:xfrm>
+          <a:prstGeom prst="rect">
+            <a:avLst/>
+          </a:prstGeom>
+          <a:solidFill>
+            <a:schemeClr val="accent6">
+              <a:lumMod val="20000"/>
+              <a:lumOff val="80000"/>
+            </a:schemeClr>
+          </a:solidFill>
+        </p:spPr>
+        <p:txBody>
+          <a:bodyPr wrap="none" rtlCol="0">
+            <a:spAutoFit/>
+          </a:bodyPr>
+          <a:lstStyle/>
+          <a:p>
+            <a:r>
+              <a:rPr lang="en-US" sz="2400" dirty="0" smtClean="0"/>
+              <a:t>control s</a:t>
+            </a:r>
+            <a:endParaRPr lang="en-US" sz="2400" dirty="0"/>
+          </a:p>
+        </p:txBody>
+      </p:sp>
+      <p:sp>
+        <p:nvSpPr>
+          <p:cNvPr id="14" name="Rectangle 13"/>
+          <p:cNvSpPr/>
+          <p:nvPr/>
+        </p:nvSpPr>
+        <p:spPr>
+          <a:xfrm>
+            <a:off x="1398494" y="1011218"/>
+            <a:ext cx="4905487" cy="4765637"/>
+          </a:xfrm>
+          <a:prstGeom prst="rect">
+            <a:avLst/>
+          </a:prstGeom>
+          <a:noFill/>
+          <a:ln w="38100" cmpd="sng">
+            <a:solidFill>
+              <a:schemeClr val="tx1"/>
+            </a:solidFill>
+          </a:ln>
+          <a:effectLst/>
+        </p:spPr>
+        <p:style>
+          <a:lnRef idx="1">
+            <a:schemeClr val="accent1"/>
+          </a:lnRef>
+          <a:fillRef idx="3">
+            <a:schemeClr val="accent1"/>
+          </a:fillRef>
+          <a:effectRef idx="2">
+            <a:schemeClr val="accent1"/>
+          </a:effectRef>
+          <a:fontRef idx="minor">
+            <a:schemeClr val="lt1"/>
+          </a:fontRef>
+        </p:style>
+        <p:txBody>
+          <a:bodyPr wrap="none" rtlCol="0" anchor="ctr"/>
+          <a:lstStyle/>
+          <a:p>
+            <a:pPr algn="ctr"/>
+            <a:endParaRPr lang="en-US" sz="3200" dirty="0" smtClean="0">
+              <a:solidFill>
+                <a:schemeClr val="tx1"/>
+              </a:solidFill>
+            </a:endParaRPr>
+          </a:p>
+        </p:txBody>
+      </p:sp>
+      <p:sp>
+        <p:nvSpPr>
+          <p:cNvPr id="16" name="TextBox 15"/>
+          <p:cNvSpPr txBox="1"/>
+          <p:nvPr/>
+        </p:nvSpPr>
+        <p:spPr>
+          <a:xfrm>
+            <a:off x="1508728" y="706603"/>
+            <a:ext cx="1192634" cy="461665"/>
+          </a:xfrm>
+          <a:prstGeom prst="rect">
+            <a:avLst/>
+          </a:prstGeom>
+          <a:solidFill>
+            <a:schemeClr val="accent6">
+              <a:lumMod val="20000"/>
+              <a:lumOff val="80000"/>
+            </a:schemeClr>
+          </a:solidFill>
+        </p:spPr>
+        <p:txBody>
+          <a:bodyPr wrap="none" rtlCol="0">
+            <a:spAutoFit/>
+          </a:bodyPr>
+          <a:lstStyle/>
+          <a:p>
+            <a:r>
+              <a:rPr lang="en-US" sz="2400" i="1" dirty="0" err="1" smtClean="0"/>
+              <a:t>toplevel</a:t>
+            </a:r>
+            <a:endParaRPr lang="en-US" sz="2400" i="1" dirty="0"/>
+          </a:p>
+        </p:txBody>
+      </p:sp>
+      <p:sp>
+        <p:nvSpPr>
+          <p:cNvPr id="17" name="Rectangle 16"/>
+          <p:cNvSpPr/>
+          <p:nvPr/>
+        </p:nvSpPr>
+        <p:spPr>
+          <a:xfrm>
+            <a:off x="2455609" y="2578087"/>
+            <a:ext cx="2761850" cy="1133301"/>
+          </a:xfrm>
+          <a:prstGeom prst="rect">
+            <a:avLst/>
+          </a:prstGeom>
+          <a:noFill/>
+          <a:ln w="38100" cmpd="sng">
+            <a:solidFill>
+              <a:schemeClr val="tx1"/>
+            </a:solidFill>
+          </a:ln>
+          <a:effectLst/>
+        </p:spPr>
+        <p:style>
+          <a:lnRef idx="1">
+            <a:schemeClr val="accent1"/>
+          </a:lnRef>
+          <a:fillRef idx="3">
+            <a:schemeClr val="accent1"/>
+          </a:fillRef>
+          <a:effectRef idx="2">
+            <a:schemeClr val="accent1"/>
+          </a:effectRef>
+          <a:fontRef idx="minor">
+            <a:schemeClr val="lt1"/>
+          </a:fontRef>
+        </p:style>
+        <p:txBody>
+          <a:bodyPr wrap="none" rtlCol="0" anchor="ctr"/>
+          <a:lstStyle/>
+          <a:p>
+            <a:pPr algn="ctr"/>
+            <a:endParaRPr lang="en-US" sz="3200" dirty="0" smtClean="0">
+              <a:solidFill>
+                <a:schemeClr val="tx1"/>
+              </a:solidFill>
+            </a:endParaRPr>
+          </a:p>
+        </p:txBody>
+      </p:sp>
+      <p:sp>
+        <p:nvSpPr>
+          <p:cNvPr id="18" name="Rectangle 17"/>
+          <p:cNvSpPr/>
+          <p:nvPr/>
+        </p:nvSpPr>
+        <p:spPr>
+          <a:xfrm>
+            <a:off x="3986382" y="2745726"/>
+            <a:ext cx="1112743" cy="798021"/>
+          </a:xfrm>
+          <a:prstGeom prst="rect">
+            <a:avLst/>
+          </a:prstGeom>
+          <a:noFill/>
+          <a:ln w="38100" cmpd="sng">
+            <a:solidFill>
+              <a:schemeClr val="tx1"/>
+            </a:solidFill>
+          </a:ln>
+          <a:effectLst/>
+        </p:spPr>
+        <p:style>
+          <a:lnRef idx="1">
+            <a:schemeClr val="accent1"/>
+          </a:lnRef>
+          <a:fillRef idx="3">
+            <a:schemeClr val="accent1"/>
+          </a:fillRef>
+          <a:effectRef idx="2">
+            <a:schemeClr val="accent1"/>
+          </a:effectRef>
+          <a:fontRef idx="minor">
+            <a:schemeClr val="lt1"/>
+          </a:fontRef>
+        </p:style>
+        <p:txBody>
+          <a:bodyPr wrap="none" rtlCol="0" anchor="ctr"/>
+          <a:lstStyle/>
+          <a:p>
+            <a:pPr algn="ctr"/>
+            <a:endParaRPr lang="en-US" sz="3200" dirty="0" smtClean="0">
+              <a:solidFill>
+                <a:schemeClr val="tx1"/>
+              </a:solidFill>
+            </a:endParaRPr>
+          </a:p>
+        </p:txBody>
+      </p:sp>
+      <p:sp>
+        <p:nvSpPr>
+          <p:cNvPr id="19" name="TextBox 18"/>
+          <p:cNvSpPr txBox="1"/>
+          <p:nvPr/>
+        </p:nvSpPr>
+        <p:spPr>
+          <a:xfrm>
+            <a:off x="2508557" y="2504592"/>
+            <a:ext cx="1424877" cy="461665"/>
+          </a:xfrm>
+          <a:prstGeom prst="rect">
+            <a:avLst/>
+          </a:prstGeom>
+          <a:solidFill>
+            <a:schemeClr val="accent6">
+              <a:lumMod val="20000"/>
+              <a:lumOff val="80000"/>
+            </a:schemeClr>
+          </a:solidFill>
+        </p:spPr>
+        <p:txBody>
+          <a:bodyPr wrap="none" rtlCol="0">
+            <a:spAutoFit/>
+          </a:bodyPr>
+          <a:lstStyle/>
+          <a:p>
+            <a:r>
+              <a:rPr lang="en-US" sz="2400" dirty="0" smtClean="0"/>
+              <a:t>control c1</a:t>
+            </a:r>
+            <a:endParaRPr lang="en-US" sz="2400" dirty="0"/>
+          </a:p>
+        </p:txBody>
+      </p:sp>
+      <p:sp>
+        <p:nvSpPr>
+          <p:cNvPr id="20" name="TextBox 19"/>
+          <p:cNvSpPr txBox="1"/>
+          <p:nvPr/>
+        </p:nvSpPr>
+        <p:spPr>
+          <a:xfrm>
+            <a:off x="4048323" y="2654301"/>
+            <a:ext cx="988860" cy="461665"/>
+          </a:xfrm>
+          <a:prstGeom prst="rect">
+            <a:avLst/>
+          </a:prstGeom>
+          <a:solidFill>
+            <a:schemeClr val="accent6">
+              <a:lumMod val="20000"/>
+              <a:lumOff val="80000"/>
+            </a:schemeClr>
+          </a:solidFill>
+        </p:spPr>
+        <p:txBody>
+          <a:bodyPr wrap="none" rtlCol="0">
+            <a:spAutoFit/>
+          </a:bodyPr>
+          <a:lstStyle/>
+          <a:p>
+            <a:r>
+              <a:rPr lang="en-US" sz="2400" dirty="0" smtClean="0"/>
+              <a:t>table t</a:t>
+            </a:r>
+            <a:endParaRPr lang="en-US" sz="2400" dirty="0"/>
+          </a:p>
+        </p:txBody>
+      </p:sp>
+      <p:sp>
+        <p:nvSpPr>
+          <p:cNvPr id="21" name="Rectangle 20"/>
+          <p:cNvSpPr/>
+          <p:nvPr/>
+        </p:nvSpPr>
+        <p:spPr>
+          <a:xfrm>
+            <a:off x="2455609" y="3990670"/>
+            <a:ext cx="2761850" cy="1133301"/>
+          </a:xfrm>
+          <a:prstGeom prst="rect">
+            <a:avLst/>
+          </a:prstGeom>
+          <a:noFill/>
+          <a:ln w="38100" cmpd="sng">
+            <a:solidFill>
+              <a:schemeClr val="tx1"/>
+            </a:solidFill>
+          </a:ln>
+          <a:effectLst/>
+        </p:spPr>
+        <p:style>
+          <a:lnRef idx="1">
+            <a:schemeClr val="accent1"/>
+          </a:lnRef>
+          <a:fillRef idx="3">
+            <a:schemeClr val="accent1"/>
+          </a:fillRef>
+          <a:effectRef idx="2">
+            <a:schemeClr val="accent1"/>
+          </a:effectRef>
+          <a:fontRef idx="minor">
+            <a:schemeClr val="lt1"/>
+          </a:fontRef>
+        </p:style>
+        <p:txBody>
+          <a:bodyPr wrap="none" rtlCol="0" anchor="ctr"/>
+          <a:lstStyle/>
+          <a:p>
+            <a:pPr algn="ctr"/>
+            <a:endParaRPr lang="en-US" sz="3200" dirty="0" smtClean="0">
+              <a:solidFill>
+                <a:schemeClr val="tx1"/>
+              </a:solidFill>
+            </a:endParaRPr>
+          </a:p>
+        </p:txBody>
+      </p:sp>
+      <p:sp>
+        <p:nvSpPr>
+          <p:cNvPr id="22" name="Rectangle 21"/>
+          <p:cNvSpPr/>
+          <p:nvPr/>
+        </p:nvSpPr>
+        <p:spPr>
+          <a:xfrm>
+            <a:off x="3986382" y="4158309"/>
+            <a:ext cx="1112743" cy="798021"/>
+          </a:xfrm>
+          <a:prstGeom prst="rect">
+            <a:avLst/>
+          </a:prstGeom>
+          <a:noFill/>
+          <a:ln w="38100" cmpd="sng">
+            <a:solidFill>
+              <a:schemeClr val="tx1"/>
+            </a:solidFill>
+          </a:ln>
+          <a:effectLst/>
+        </p:spPr>
+        <p:style>
+          <a:lnRef idx="1">
+            <a:schemeClr val="accent1"/>
+          </a:lnRef>
+          <a:fillRef idx="3">
+            <a:schemeClr val="accent1"/>
+          </a:fillRef>
+          <a:effectRef idx="2">
+            <a:schemeClr val="accent1"/>
+          </a:effectRef>
+          <a:fontRef idx="minor">
+            <a:schemeClr val="lt1"/>
+          </a:fontRef>
+        </p:style>
+        <p:txBody>
+          <a:bodyPr wrap="none" rtlCol="0" anchor="ctr"/>
+          <a:lstStyle/>
+          <a:p>
+            <a:pPr algn="ctr"/>
+            <a:endParaRPr lang="en-US" sz="3200" dirty="0" smtClean="0">
+              <a:solidFill>
+                <a:schemeClr val="tx1"/>
+              </a:solidFill>
+            </a:endParaRPr>
+          </a:p>
+        </p:txBody>
+      </p:sp>
+      <p:sp>
+        <p:nvSpPr>
+          <p:cNvPr id="23" name="TextBox 22"/>
+          <p:cNvSpPr txBox="1"/>
+          <p:nvPr/>
+        </p:nvSpPr>
+        <p:spPr>
+          <a:xfrm>
+            <a:off x="2530534" y="3862062"/>
+            <a:ext cx="1424877" cy="461665"/>
+          </a:xfrm>
+          <a:prstGeom prst="rect">
+            <a:avLst/>
+          </a:prstGeom>
+          <a:solidFill>
+            <a:schemeClr val="accent6">
+              <a:lumMod val="20000"/>
+              <a:lumOff val="80000"/>
+            </a:schemeClr>
+          </a:solidFill>
+        </p:spPr>
+        <p:txBody>
+          <a:bodyPr wrap="none" rtlCol="0">
+            <a:spAutoFit/>
+          </a:bodyPr>
+          <a:lstStyle/>
+          <a:p>
+            <a:r>
+              <a:rPr lang="en-US" sz="2400" dirty="0" smtClean="0"/>
+              <a:t>control c2</a:t>
+            </a:r>
+            <a:endParaRPr lang="en-US" sz="2400" dirty="0"/>
+          </a:p>
+        </p:txBody>
+      </p:sp>
+      <p:sp>
+        <p:nvSpPr>
+          <p:cNvPr id="24" name="TextBox 23"/>
+          <p:cNvSpPr txBox="1"/>
+          <p:nvPr/>
+        </p:nvSpPr>
+        <p:spPr>
+          <a:xfrm>
+            <a:off x="4048323" y="4078002"/>
+            <a:ext cx="988860" cy="461665"/>
+          </a:xfrm>
+          <a:prstGeom prst="rect">
+            <a:avLst/>
+          </a:prstGeom>
+          <a:solidFill>
+            <a:schemeClr val="accent6">
+              <a:lumMod val="20000"/>
+              <a:lumOff val="80000"/>
+            </a:schemeClr>
+          </a:solidFill>
+        </p:spPr>
+        <p:txBody>
+          <a:bodyPr wrap="none" rtlCol="0">
+            <a:spAutoFit/>
+          </a:bodyPr>
+          <a:lstStyle/>
+          <a:p>
+            <a:r>
+              <a:rPr lang="en-US" sz="2400" dirty="0" smtClean="0"/>
+              <a:t>table t</a:t>
+            </a:r>
+            <a:endParaRPr lang="en-US" sz="2400" dirty="0"/>
+          </a:p>
+        </p:txBody>
+      </p:sp>
+    </p:spTree>
+    <p:extLst>
+      <p:ext uri="{BB962C8B-B14F-4D97-AF65-F5344CB8AC3E}">
+        <p14:creationId xmlns:p14="http://schemas.microsoft.com/office/powerpoint/2010/main" val="1304484956"/>
       </p:ext>
     </p:extLst>
   </p:cSld>
@@ -16513,12 +16881,20 @@
           <a:p>
             <a:pPr algn="ctr"/>
             <a:r>
+              <a:rPr lang="en-US" dirty="0" smtClean="0">
+                <a:solidFill>
+                  <a:schemeClr val="tx1"/>
+                </a:solidFill>
+              </a:rPr>
+              <a:t>P4</a:t>
+            </a:r>
+            <a:r>
               <a:rPr lang="en-US" dirty="0">
                 <a:solidFill>
                   <a:schemeClr val="tx1"/>
                 </a:solidFill>
               </a:rPr>
-              <a:t>target</a:t>
+              <a:t/>
             </a:r>
             <a:br>
               <a:rPr lang="en-US" dirty="0">
@@ -19337,7 +19713,7 @@
         </p:nvSpPr>
         <p:spPr>
           <a:xfrm>
-            <a:off x="5274175" y="1313259"/>
+            <a:off x="5274175" y="1323892"/>
             <a:ext cx="1498733" cy="1587611"/>
           </a:xfrm>
           <a:prstGeom prst="rect">
@@ -19406,7 +19782,7 @@
         </p:nvSpPr>
         <p:spPr>
           <a:xfrm>
-            <a:off x="5500716" y="2362200"/>
+            <a:off x="5500716" y="2372833"/>
             <a:ext cx="980382" cy="418976"/>
           </a:xfrm>
           <a:prstGeom prst="rect">
@@ -19464,7 +19840,7 @@
         </p:nvSpPr>
         <p:spPr>
           <a:xfrm>
-            <a:off x="3331494" y="1782053"/>
+            <a:off x="3331494" y="1792686"/>
             <a:ext cx="1457438" cy="584776"/>
           </a:xfrm>
           <a:prstGeom prst="rect">
@@ -19503,7 +19879,7 @@
         </p:nvCxnSpPr>
         <p:spPr>
           <a:xfrm>
-            <a:off x="4788932" y="2074441"/>
+            <a:off x="4788932" y="2085074"/>
             <a:ext cx="1201975" cy="287759"/>
           </a:xfrm>
           <a:prstGeom prst="bentConnector2">
@@ -19540,7 +19916,7 @@
         </p:nvSpPr>
         <p:spPr>
           <a:xfrm>
-            <a:off x="6136967" y="2074441"/>
+            <a:off x="6136967" y="2085074"/>
             <a:ext cx="262193" cy="367236"/>
           </a:xfrm>
           <a:prstGeom prst="upDownArrow">
@@ -19591,7 +19967,7 @@
         </p:nvSpPr>
         <p:spPr>
           <a:xfrm>
-            <a:off x="6895688" y="1299785"/>
+            <a:off x="6895688" y="1310418"/>
             <a:ext cx="1395071" cy="369332"/>
           </a:xfrm>
           <a:prstGeom prst="rect">
@@ -19622,7 +19998,7 @@
         </p:nvCxnSpPr>
         <p:spPr>
           <a:xfrm flipH="1">
-            <a:off x="6399160" y="1669117"/>
+            <a:off x="6399160" y="1679750"/>
             <a:ext cx="1194064" cy="551335"/>
           </a:xfrm>
           <a:prstGeom prst="straightConnector1">

</xml_diff>